<commit_message>
Final update to slides after SafeCODE presentation.
</commit_message>
<xml_diff>
--- a/SAFECode's Choosing Better Open Source.pptx
+++ b/SAFECode's Choosing Better Open Source.pptx
@@ -5,10 +5,10 @@
     <p:sldMasterId id="2147483778" r:id="rId4"/>
   </p:sldMasterIdLst>
   <p:notesMasterIdLst>
-    <p:notesMasterId r:id="rId46"/>
+    <p:notesMasterId r:id="rId40"/>
   </p:notesMasterIdLst>
   <p:handoutMasterIdLst>
-    <p:handoutMasterId r:id="rId47"/>
+    <p:handoutMasterId r:id="rId41"/>
   </p:handoutMasterIdLst>
   <p:sldIdLst>
     <p:sldId id="258" r:id="rId5"/>
@@ -43,20 +43,14 @@
     <p:sldId id="397" r:id="rId34"/>
     <p:sldId id="368" r:id="rId35"/>
     <p:sldId id="369" r:id="rId36"/>
-    <p:sldId id="396" r:id="rId37"/>
-    <p:sldId id="374" r:id="rId38"/>
-    <p:sldId id="398" r:id="rId39"/>
-    <p:sldId id="328" r:id="rId40"/>
-    <p:sldId id="259" r:id="rId41"/>
-    <p:sldId id="260" r:id="rId42"/>
-    <p:sldId id="261" r:id="rId43"/>
-    <p:sldId id="262" r:id="rId44"/>
-    <p:sldId id="263" r:id="rId45"/>
+    <p:sldId id="374" r:id="rId37"/>
+    <p:sldId id="398" r:id="rId38"/>
+    <p:sldId id="328" r:id="rId39"/>
   </p:sldIdLst>
   <p:sldSz cx="9144000" cy="5143500" type="screen16x9"/>
   <p:notesSz cx="7010400" cy="9296400"/>
   <p:custDataLst>
-    <p:tags r:id="rId48"/>
+    <p:tags r:id="rId42"/>
   </p:custDataLst>
   <p:defaultTextStyle>
     <a:defPPr>
@@ -340,7 +334,7 @@
               <a:rPr lang="en-US" smtClean="0">
                 <a:effectLst/>
               </a:rPr>
-              <a:t>3/21/19</a:t>
+              <a:t>3/27/19</a:t>
             </a:fld>
             <a:endParaRPr lang="en-US">
               <a:effectLst/>
@@ -531,7 +525,7 @@
               <a:rPr lang="en-US" smtClean="0">
                 <a:effectLst/>
               </a:rPr>
-              <a:t>3/21/19</a:t>
+              <a:t>3/27/19</a:t>
             </a:fld>
             <a:endParaRPr lang="en-US">
               <a:effectLst/>
@@ -864,7 +858,15 @@
           <a:p>
             <a:r>
               <a:rPr lang="en-US" dirty="0"/>
-              <a:t>Okay, so that’s a lot of disheartening news.</a:t>
+              <a:t>I am a Security Researcher for Intel. I have been at Intel for 12 </a:t>
+            </a:r>
+            <a:r>
+              <a:rPr lang="en-US" dirty="0" err="1"/>
+              <a:t>yrs</a:t>
+            </a:r>
+            <a:r>
+              <a:rPr lang="en-US" dirty="0"/>
+              <a:t> 6 of which have been with a security focus on open source. My career spans 35 years and includes 7 patents for cable and connector design. I worked mainly in the telecom space working on embedded software for major telecom equipment ranging from 56 port T1 to stratum 3 clock drivers all requiring 7 9’s of reliability. I have been working with open source since the early 90’s and continue to do so today.</a:t>
             </a:r>
           </a:p>
         </p:txBody>
@@ -876,7 +878,7 @@
             <a:spLocks noGrp="1"/>
           </p:cNvSpPr>
           <p:nvPr>
-            <p:ph type="sldNum" sz="quarter" idx="10"/>
+            <p:ph type="sldNum" sz="quarter" idx="5"/>
           </p:nvPr>
         </p:nvSpPr>
         <p:spPr/>
@@ -885,18 +887,21 @@
           <a:lstStyle/>
           <a:p>
             <a:fld id="{D61C8689-8455-3546-ADF9-3B7273760F66}" type="slidenum">
-              <a:rPr lang="en-US" smtClean="0"/>
-              <a:pPr/>
-              <a:t>3</a:t>
+              <a:rPr lang="en-US" smtClean="0">
+                <a:effectLst/>
+              </a:rPr>
+              <a:t>1</a:t>
             </a:fld>
-            <a:endParaRPr lang="en-US" dirty="0"/>
+            <a:endParaRPr lang="en-US">
+              <a:effectLst/>
+            </a:endParaRPr>
           </a:p>
         </p:txBody>
       </p:sp>
     </p:spTree>
     <p:extLst>
       <p:ext uri="{BB962C8B-B14F-4D97-AF65-F5344CB8AC3E}">
-        <p14:creationId xmlns:p14="http://schemas.microsoft.com/office/powerpoint/2010/main" val="1330503285"/>
+        <p14:creationId xmlns:p14="http://schemas.microsoft.com/office/powerpoint/2010/main" val="3439274626"/>
       </p:ext>
     </p:extLst>
   </p:cSld>
@@ -970,26 +975,65 @@
             <a:r>
               <a:rPr lang="en-US" dirty="0">
                 <a:solidFill>
-                  <a:schemeClr val="bg2"/>
+                  <a:schemeClr val="accent2"/>
                 </a:solidFill>
                 <a:latin typeface="Muli"/>
                 <a:ea typeface="Muli"/>
                 <a:cs typeface="Muli"/>
                 <a:sym typeface="Muli"/>
               </a:rPr>
-              <a:t>https://github.com/kbranigan/cJSON</a:t>
+              <a:t>Sources: https://github.com/andi506/crypto-js</a:t>
+            </a:r>
+            <a:endParaRPr lang="en" dirty="0">
+              <a:solidFill>
+                <a:schemeClr val="bg2"/>
+              </a:solidFill>
+              <a:latin typeface="Muli"/>
+              <a:ea typeface="Muli"/>
+              <a:cs typeface="Muli"/>
+              <a:sym typeface="Muli"/>
+            </a:endParaRPr>
+          </a:p>
+          <a:p>
+            <a:pPr marL="0" marR="0" indent="0" algn="l" defTabSz="457200" rtl="0" eaLnBrk="1" fontAlgn="auto" latinLnBrk="0" hangingPunct="1">
+              <a:lnSpc>
+                <a:spcPct val="100000"/>
+              </a:lnSpc>
+              <a:spcBef>
+                <a:spcPts val="0"/>
+              </a:spcBef>
+              <a:spcAft>
+                <a:spcPts val="0"/>
+              </a:spcAft>
+              <a:buClrTx/>
+              <a:buSzTx/>
+              <a:buFontTx/>
+              <a:buNone/>
+              <a:tabLst/>
+              <a:defRPr/>
+            </a:pPr>
+            <a:r>
+              <a:rPr lang="en" dirty="0">
+                <a:solidFill>
+                  <a:schemeClr val="bg2"/>
+                </a:solidFill>
+                <a:latin typeface="Muli"/>
+                <a:ea typeface="Muli"/>
+                <a:cs typeface="Muli"/>
+                <a:sym typeface="Muli"/>
+              </a:rPr>
+              <a:t>https://github.com/01org/IntelRackScaleArchitecture</a:t>
             </a:r>
           </a:p>
           <a:p>
             <a:r>
               <a:rPr lang="en-US" dirty="0"/>
-              <a:t>What does this even</a:t>
+              <a:t>The first one here is a crypto package</a:t>
             </a:r>
             <a:r>
               <a:rPr lang="en-US" baseline="0" dirty="0"/>
-              <a:t> mean?  Is the license of this code legit or are we potentially being exposed to a copyright lawsuit?  Is this a dead copy that’s not being updated?  Where did this code come from?</a:t>
-            </a:r>
-            <a:endParaRPr lang="en-US" dirty="0"/>
+              <a:t> that quietly says [read end of quote] which basically translates to “this is sometimes really slow and also probably insecure, don’t use it” and the second one is much more explicit “this doesn’t meet our quality standards for commercial products, don’t use it”</a:t>
+            </a:r>
           </a:p>
         </p:txBody>
       </p:sp>
@@ -1011,7 +1055,7 @@
             <a:fld id="{D61C8689-8455-3546-ADF9-3B7273760F66}" type="slidenum">
               <a:rPr lang="en-US" smtClean="0"/>
               <a:pPr/>
-              <a:t>12</a:t>
+              <a:t>11</a:t>
             </a:fld>
             <a:endParaRPr lang="en-US" dirty="0"/>
           </a:p>
@@ -1020,7 +1064,7 @@
     </p:spTree>
     <p:extLst>
       <p:ext uri="{BB962C8B-B14F-4D97-AF65-F5344CB8AC3E}">
-        <p14:creationId xmlns:p14="http://schemas.microsoft.com/office/powerpoint/2010/main" val="1409626992"/>
+        <p14:creationId xmlns:p14="http://schemas.microsoft.com/office/powerpoint/2010/main" val="1564770546"/>
       </p:ext>
     </p:extLst>
   </p:cSld>
@@ -1074,21 +1118,44 @@
           <a:bodyPr/>
           <a:lstStyle/>
           <a:p>
+            <a:pPr marL="0" marR="0" lvl="0" indent="0" algn="l" defTabSz="457200" rtl="0" eaLnBrk="1" fontAlgn="auto" latinLnBrk="0" hangingPunct="1">
+              <a:lnSpc>
+                <a:spcPct val="100000"/>
+              </a:lnSpc>
+              <a:spcBef>
+                <a:spcPts val="0"/>
+              </a:spcBef>
+              <a:spcAft>
+                <a:spcPts val="0"/>
+              </a:spcAft>
+              <a:buClrTx/>
+              <a:buSzTx/>
+              <a:buFontTx/>
+              <a:buNone/>
+              <a:tabLst/>
+              <a:defRPr/>
+            </a:pPr>
+            <a:r>
+              <a:rPr lang="en-US" dirty="0">
+                <a:solidFill>
+                  <a:schemeClr val="bg2"/>
+                </a:solidFill>
+                <a:latin typeface="Muli"/>
+                <a:ea typeface="Muli"/>
+                <a:cs typeface="Muli"/>
+                <a:sym typeface="Muli"/>
+              </a:rPr>
+              <a:t>https://github.com/kbranigan/cJSON</a:t>
+            </a:r>
+          </a:p>
+          <a:p>
             <a:r>
               <a:rPr lang="en-US" dirty="0"/>
-              <a:t>Another warning sign we see is archived code sources,</a:t>
+              <a:t>What does this even</a:t>
             </a:r>
             <a:r>
               <a:rPr lang="en-US" baseline="0" dirty="0"/>
-              <a:t> like code.google.com.  It shut down in January 2016: if you’re using that </a:t>
-            </a:r>
-            <a:r>
-              <a:rPr lang="en-US" baseline="0" dirty="0" err="1"/>
-              <a:t>url</a:t>
-            </a:r>
-            <a:r>
-              <a:rPr lang="en-US" baseline="0" dirty="0"/>
-              <a:t>, you’re not getting the latest updated releases.</a:t>
+              <a:t> mean?  Is the license of this code legit or are we potentially being exposed to a copyright lawsuit?  Is this a dead copy that’s not being updated?  Where did this code come from?</a:t>
             </a:r>
             <a:endParaRPr lang="en-US" dirty="0"/>
           </a:p>
@@ -1112,7 +1179,7 @@
             <a:fld id="{D61C8689-8455-3546-ADF9-3B7273760F66}" type="slidenum">
               <a:rPr lang="en-US" smtClean="0"/>
               <a:pPr/>
-              <a:t>13</a:t>
+              <a:t>12</a:t>
             </a:fld>
             <a:endParaRPr lang="en-US" dirty="0"/>
           </a:p>
@@ -1121,7 +1188,7 @@
     </p:spTree>
     <p:extLst>
       <p:ext uri="{BB962C8B-B14F-4D97-AF65-F5344CB8AC3E}">
-        <p14:creationId xmlns:p14="http://schemas.microsoft.com/office/powerpoint/2010/main" val="4219331668"/>
+        <p14:creationId xmlns:p14="http://schemas.microsoft.com/office/powerpoint/2010/main" val="1409626992"/>
       </p:ext>
     </p:extLst>
   </p:cSld>
@@ -1175,112 +1242,22 @@
           <a:bodyPr/>
           <a:lstStyle/>
           <a:p>
-            <a:pPr lvl="0">
-              <a:spcBef>
-                <a:spcPts val="0"/>
-              </a:spcBef>
-              <a:buNone/>
-            </a:pPr>
-            <a:r>
-              <a:rPr lang="en-US" dirty="0" err="1"/>
-              <a:t>ThisFrom</a:t>
-            </a:r>
             <a:r>
               <a:rPr lang="en-US" dirty="0"/>
-              <a:t> CPAN:</a:t>
-            </a:r>
-          </a:p>
-          <a:p>
-            <a:pPr marL="457200" lvl="0" indent="-295275">
-              <a:lnSpc>
-                <a:spcPct val="171429"/>
-              </a:lnSpc>
-              <a:spcBef>
-                <a:spcPts val="0"/>
-              </a:spcBef>
-              <a:buClr>
-                <a:srgbClr val="444444"/>
-              </a:buClr>
-              <a:buSzPct val="95454"/>
-              <a:buFont typeface="Arial"/>
-              <a:buChar char="●"/>
-            </a:pPr>
-            <a:r>
-              <a:rPr lang="en-US" sz="1200" dirty="0">
-                <a:solidFill>
-                  <a:srgbClr val="444444"/>
-                </a:solidFill>
-                <a:highlight>
-                  <a:srgbClr val="FFFFFF"/>
-                </a:highlight>
-              </a:rPr>
-              <a:t>A co-maintainer uploaded a new release, but because of an oversight wasn’t granted permission on one of the modules. This often happens with distributions that have a different release manager each cycle.</a:t>
-            </a:r>
-          </a:p>
-          <a:p>
-            <a:pPr marL="457200" lvl="0" indent="-295275">
-              <a:lnSpc>
-                <a:spcPct val="171429"/>
-              </a:lnSpc>
-              <a:spcBef>
-                <a:spcPts val="0"/>
-              </a:spcBef>
-              <a:buClr>
-                <a:srgbClr val="FF0000"/>
-              </a:buClr>
-              <a:buSzPct val="95454"/>
-              <a:buFont typeface="Arial"/>
-              <a:buChar char="●"/>
-            </a:pPr>
-            <a:r>
-              <a:rPr lang="en-US" sz="1200" b="1" dirty="0">
-                <a:solidFill>
-                  <a:srgbClr val="FF0000"/>
-                </a:solidFill>
-                <a:highlight>
-                  <a:srgbClr val="FFFFFF"/>
-                </a:highlight>
-              </a:rPr>
-              <a:t>Someone without co-maintainer permissions forked the distribution and uploaded it.</a:t>
-            </a:r>
-          </a:p>
-          <a:p>
-            <a:pPr marL="457200" lvl="0" indent="-295275">
-              <a:lnSpc>
-                <a:spcPct val="171429"/>
-              </a:lnSpc>
-              <a:spcBef>
-                <a:spcPts val="0"/>
-              </a:spcBef>
-              <a:buClr>
-                <a:srgbClr val="444444"/>
-              </a:buClr>
-              <a:buSzPct val="95454"/>
-              <a:buFont typeface="Arial"/>
-              <a:buChar char="●"/>
-            </a:pPr>
-            <a:r>
-              <a:rPr lang="en-US" sz="1200" dirty="0">
-                <a:solidFill>
-                  <a:srgbClr val="444444"/>
-                </a:solidFill>
-                <a:highlight>
-                  <a:srgbClr val="FFFFFF"/>
-                </a:highlight>
-              </a:rPr>
-              <a:t>An author makes a new release with a new namespace without realizing that namespace is taken by another author.</a:t>
-            </a:r>
-          </a:p>
-          <a:p>
-            <a:pPr lvl="0">
-              <a:spcBef>
-                <a:spcPts val="0"/>
-              </a:spcBef>
-              <a:buNone/>
-            </a:pPr>
-            <a:endParaRPr lang="en-US" dirty="0"/>
-          </a:p>
-          <a:p>
+              <a:t>Another warning sign we see is archived code sources,</a:t>
+            </a:r>
+            <a:r>
+              <a:rPr lang="en-US" baseline="0" dirty="0"/>
+              <a:t> like code.google.com.  It shut down in January 2016: if you’re using that </a:t>
+            </a:r>
+            <a:r>
+              <a:rPr lang="en-US" baseline="0" dirty="0" err="1"/>
+              <a:t>url</a:t>
+            </a:r>
+            <a:r>
+              <a:rPr lang="en-US" baseline="0" dirty="0"/>
+              <a:t>, you’re not getting the latest updated releases.</a:t>
+            </a:r>
             <a:endParaRPr lang="en-US" dirty="0"/>
           </a:p>
         </p:txBody>
@@ -1303,7 +1280,7 @@
             <a:fld id="{D61C8689-8455-3546-ADF9-3B7273760F66}" type="slidenum">
               <a:rPr lang="en-US" smtClean="0"/>
               <a:pPr/>
-              <a:t>14</a:t>
+              <a:t>13</a:t>
             </a:fld>
             <a:endParaRPr lang="en-US" dirty="0"/>
           </a:p>
@@ -1312,7 +1289,7 @@
     </p:spTree>
     <p:extLst>
       <p:ext uri="{BB962C8B-B14F-4D97-AF65-F5344CB8AC3E}">
-        <p14:creationId xmlns:p14="http://schemas.microsoft.com/office/powerpoint/2010/main" val="615002111"/>
+        <p14:creationId xmlns:p14="http://schemas.microsoft.com/office/powerpoint/2010/main" val="4219331668"/>
       </p:ext>
     </p:extLst>
   </p:cSld>
@@ -1366,61 +1343,108 @@
           <a:bodyPr/>
           <a:lstStyle/>
           <a:p>
-            <a:pPr marL="0" marR="0" indent="0" algn="l" defTabSz="457200" rtl="0" eaLnBrk="1" fontAlgn="auto" latinLnBrk="0" hangingPunct="1">
+            <a:pPr lvl="0">
+              <a:spcBef>
+                <a:spcPts val="0"/>
+              </a:spcBef>
+              <a:buNone/>
+            </a:pPr>
+            <a:r>
+              <a:rPr lang="en-US" dirty="0"/>
+              <a:t>This from CPAN:</a:t>
+            </a:r>
+          </a:p>
+          <a:p>
+            <a:pPr marL="457200" lvl="0" indent="-295275">
               <a:lnSpc>
-                <a:spcPct val="100000"/>
+                <a:spcPct val="171429"/>
               </a:lnSpc>
               <a:spcBef>
                 <a:spcPts val="0"/>
               </a:spcBef>
-              <a:spcAft>
+              <a:buClr>
+                <a:srgbClr val="444444"/>
+              </a:buClr>
+              <a:buSzPct val="95454"/>
+              <a:buFont typeface="Arial"/>
+              <a:buChar char="●"/>
+            </a:pPr>
+            <a:r>
+              <a:rPr lang="en-US" sz="1200" dirty="0">
+                <a:solidFill>
+                  <a:srgbClr val="444444"/>
+                </a:solidFill>
+                <a:highlight>
+                  <a:srgbClr val="FFFFFF"/>
+                </a:highlight>
+              </a:rPr>
+              <a:t>A co-maintainer uploaded a new release, but because of an oversight wasn’t granted permission on one of the modules. This often happens with distributions that have a different release manager each cycle.</a:t>
+            </a:r>
+          </a:p>
+          <a:p>
+            <a:pPr marL="457200" lvl="0" indent="-295275">
+              <a:lnSpc>
+                <a:spcPct val="171429"/>
+              </a:lnSpc>
+              <a:spcBef>
                 <a:spcPts val="0"/>
-              </a:spcAft>
-              <a:buClrTx/>
-              <a:buSzTx/>
-              <a:buFontTx/>
+              </a:spcBef>
+              <a:buClr>
+                <a:srgbClr val="FF0000"/>
+              </a:buClr>
+              <a:buSzPct val="95454"/>
+              <a:buFont typeface="Arial"/>
+              <a:buChar char="●"/>
+            </a:pPr>
+            <a:r>
+              <a:rPr lang="en-US" sz="1200" b="1" dirty="0">
+                <a:solidFill>
+                  <a:srgbClr val="FF0000"/>
+                </a:solidFill>
+                <a:highlight>
+                  <a:srgbClr val="FFFFFF"/>
+                </a:highlight>
+              </a:rPr>
+              <a:t>Someone without co-maintainer permissions forked the distribution and uploaded it.</a:t>
+            </a:r>
+          </a:p>
+          <a:p>
+            <a:pPr marL="457200" lvl="0" indent="-295275">
+              <a:lnSpc>
+                <a:spcPct val="171429"/>
+              </a:lnSpc>
+              <a:spcBef>
+                <a:spcPts val="0"/>
+              </a:spcBef>
+              <a:buClr>
+                <a:srgbClr val="444444"/>
+              </a:buClr>
+              <a:buSzPct val="95454"/>
+              <a:buFont typeface="Arial"/>
+              <a:buChar char="●"/>
+            </a:pPr>
+            <a:r>
+              <a:rPr lang="en-US" sz="1200" dirty="0">
+                <a:solidFill>
+                  <a:srgbClr val="444444"/>
+                </a:solidFill>
+                <a:highlight>
+                  <a:srgbClr val="FFFFFF"/>
+                </a:highlight>
+              </a:rPr>
+              <a:t>An author makes a new release with a new namespace without realizing that namespace is taken by another author.</a:t>
+            </a:r>
+          </a:p>
+          <a:p>
+            <a:pPr lvl="0">
+              <a:spcBef>
+                <a:spcPts val="0"/>
+              </a:spcBef>
               <a:buNone/>
-              <a:tabLst/>
-              <a:defRPr/>
             </a:pPr>
-            <a:r>
-              <a:rPr lang="en-US" dirty="0">
-                <a:solidFill>
-                  <a:schemeClr val="bg2"/>
-                </a:solidFill>
-                <a:latin typeface="Muli"/>
-                <a:ea typeface="Muli"/>
-                <a:cs typeface="Muli"/>
-                <a:sym typeface="Muli"/>
-              </a:rPr>
-              <a:t>http://opencsv.sourceforge.net/</a:t>
-            </a:r>
-          </a:p>
-          <a:p>
-            <a:r>
-              <a:rPr lang="en-US" dirty="0"/>
-              <a:t>So here’s two ways</a:t>
-            </a:r>
-            <a:r>
-              <a:rPr lang="en-US" baseline="0" dirty="0"/>
-              <a:t> developers might tell you that this is a hobby project and not something that’s supported: in the first one, the </a:t>
-            </a:r>
-            <a:r>
-              <a:rPr lang="en-US" baseline="0" dirty="0" err="1"/>
-              <a:t>dev</a:t>
-            </a:r>
-            <a:r>
-              <a:rPr lang="en-US" baseline="0" dirty="0"/>
-              <a:t> is giving apologies for not having time to work on </a:t>
-            </a:r>
-            <a:r>
-              <a:rPr lang="en-US" baseline="0" dirty="0" err="1"/>
-              <a:t>cryptoJS</a:t>
-            </a:r>
-            <a:r>
-              <a:rPr lang="en-US" baseline="0" dirty="0"/>
-              <a:t>. In the second, well… is “developed in a few hours” a sign that this code is professional work?  </a:t>
-            </a:r>
+            <a:endParaRPr lang="en-US" dirty="0"/>
+          </a:p>
+          <a:p>
             <a:endParaRPr lang="en-US" dirty="0"/>
           </a:p>
         </p:txBody>
@@ -1443,7 +1467,7 @@
             <a:fld id="{D61C8689-8455-3546-ADF9-3B7273760F66}" type="slidenum">
               <a:rPr lang="en-US" smtClean="0"/>
               <a:pPr/>
-              <a:t>15</a:t>
+              <a:t>14</a:t>
             </a:fld>
             <a:endParaRPr lang="en-US" dirty="0"/>
           </a:p>
@@ -1452,7 +1476,7 @@
     </p:spTree>
     <p:extLst>
       <p:ext uri="{BB962C8B-B14F-4D97-AF65-F5344CB8AC3E}">
-        <p14:creationId xmlns:p14="http://schemas.microsoft.com/office/powerpoint/2010/main" val="15828353"/>
+        <p14:creationId xmlns:p14="http://schemas.microsoft.com/office/powerpoint/2010/main" val="615002111"/>
       </p:ext>
     </p:extLst>
   </p:cSld>
@@ -1506,6 +1530,146 @@
           <a:bodyPr/>
           <a:lstStyle/>
           <a:p>
+            <a:pPr marL="0" marR="0" indent="0" algn="l" defTabSz="457200" rtl="0" eaLnBrk="1" fontAlgn="auto" latinLnBrk="0" hangingPunct="1">
+              <a:lnSpc>
+                <a:spcPct val="100000"/>
+              </a:lnSpc>
+              <a:spcBef>
+                <a:spcPts val="0"/>
+              </a:spcBef>
+              <a:spcAft>
+                <a:spcPts val="0"/>
+              </a:spcAft>
+              <a:buClrTx/>
+              <a:buSzTx/>
+              <a:buFontTx/>
+              <a:buNone/>
+              <a:tabLst/>
+              <a:defRPr/>
+            </a:pPr>
+            <a:r>
+              <a:rPr lang="en-US" dirty="0">
+                <a:solidFill>
+                  <a:schemeClr val="bg2"/>
+                </a:solidFill>
+                <a:latin typeface="Muli"/>
+                <a:ea typeface="Muli"/>
+                <a:cs typeface="Muli"/>
+                <a:sym typeface="Muli"/>
+              </a:rPr>
+              <a:t>http://opencsv.sourceforge.net/</a:t>
+            </a:r>
+          </a:p>
+          <a:p>
+            <a:r>
+              <a:rPr lang="en-US" dirty="0"/>
+              <a:t>So here’s two ways</a:t>
+            </a:r>
+            <a:r>
+              <a:rPr lang="en-US" baseline="0" dirty="0"/>
+              <a:t> developers might tell you that this is a hobby project and not something that’s supported: in the first one, the </a:t>
+            </a:r>
+            <a:r>
+              <a:rPr lang="en-US" baseline="0" dirty="0" err="1"/>
+              <a:t>dev</a:t>
+            </a:r>
+            <a:r>
+              <a:rPr lang="en-US" baseline="0" dirty="0"/>
+              <a:t> is giving apologies for not having time to work on </a:t>
+            </a:r>
+            <a:r>
+              <a:rPr lang="en-US" baseline="0" dirty="0" err="1"/>
+              <a:t>cryptoJS</a:t>
+            </a:r>
+            <a:r>
+              <a:rPr lang="en-US" baseline="0" dirty="0"/>
+              <a:t>. In the second, well… is “developed in a few hours” a sign that this code is professional work?  </a:t>
+            </a:r>
+            <a:endParaRPr lang="en-US" dirty="0"/>
+          </a:p>
+        </p:txBody>
+      </p:sp>
+      <p:sp>
+        <p:nvSpPr>
+          <p:cNvPr id="4" name="Slide Number Placeholder 3"/>
+          <p:cNvSpPr>
+            <a:spLocks noGrp="1"/>
+          </p:cNvSpPr>
+          <p:nvPr>
+            <p:ph type="sldNum" sz="quarter" idx="10"/>
+          </p:nvPr>
+        </p:nvSpPr>
+        <p:spPr/>
+        <p:txBody>
+          <a:bodyPr/>
+          <a:lstStyle/>
+          <a:p>
+            <a:fld id="{D61C8689-8455-3546-ADF9-3B7273760F66}" type="slidenum">
+              <a:rPr lang="en-US" smtClean="0"/>
+              <a:pPr/>
+              <a:t>15</a:t>
+            </a:fld>
+            <a:endParaRPr lang="en-US" dirty="0"/>
+          </a:p>
+        </p:txBody>
+      </p:sp>
+    </p:spTree>
+    <p:extLst>
+      <p:ext uri="{BB962C8B-B14F-4D97-AF65-F5344CB8AC3E}">
+        <p14:creationId xmlns:p14="http://schemas.microsoft.com/office/powerpoint/2010/main" val="15828353"/>
+      </p:ext>
+    </p:extLst>
+  </p:cSld>
+  <p:clrMapOvr>
+    <a:masterClrMapping/>
+  </p:clrMapOvr>
+</p:notes>
+</file>
+
+<file path=ppt/notesSlides/notesSlide15.xml><?xml version="1.0" encoding="utf-8"?>
+<p:notes xmlns:a="http://schemas.openxmlformats.org/drawingml/2006/main" xmlns:r="http://schemas.openxmlformats.org/officeDocument/2006/relationships" xmlns:p="http://schemas.openxmlformats.org/presentationml/2006/main">
+  <p:cSld>
+    <p:spTree>
+      <p:nvGrpSpPr>
+        <p:cNvPr id="1" name=""/>
+        <p:cNvGrpSpPr/>
+        <p:nvPr/>
+      </p:nvGrpSpPr>
+      <p:grpSpPr>
+        <a:xfrm>
+          <a:off x="0" y="0"/>
+          <a:ext cx="0" cy="0"/>
+          <a:chOff x="0" y="0"/>
+          <a:chExt cx="0" cy="0"/>
+        </a:xfrm>
+      </p:grpSpPr>
+      <p:sp>
+        <p:nvSpPr>
+          <p:cNvPr id="2" name="Slide Image Placeholder 1"/>
+          <p:cNvSpPr>
+            <a:spLocks noGrp="1" noRot="1" noChangeAspect="1"/>
+          </p:cNvSpPr>
+          <p:nvPr>
+            <p:ph type="sldImg"/>
+          </p:nvPr>
+        </p:nvSpPr>
+        <p:spPr/>
+      </p:sp>
+      <p:sp>
+        <p:nvSpPr>
+          <p:cNvPr id="3" name="Notes Placeholder 2"/>
+          <p:cNvSpPr>
+            <a:spLocks noGrp="1"/>
+          </p:cNvSpPr>
+          <p:nvPr>
+            <p:ph type="body" idx="1"/>
+          </p:nvPr>
+        </p:nvSpPr>
+        <p:spPr/>
+        <p:txBody>
+          <a:bodyPr/>
+          <a:lstStyle/>
+          <a:p>
             <a:pPr marL="0" marR="0" lvl="0" indent="0" algn="l" defTabSz="457200" rtl="0" eaLnBrk="1" fontAlgn="auto" latinLnBrk="0" hangingPunct="1">
               <a:lnSpc>
                 <a:spcPct val="100000"/>
@@ -1646,7 +1810,7 @@
 </p:notes>
 </file>
 
-<file path=ppt/notesSlides/notesSlide15.xml><?xml version="1.0" encoding="utf-8"?>
+<file path=ppt/notesSlides/notesSlide16.xml><?xml version="1.0" encoding="utf-8"?>
 <p:notes xmlns:a="http://schemas.openxmlformats.org/drawingml/2006/main" xmlns:r="http://schemas.openxmlformats.org/officeDocument/2006/relationships" xmlns:p="http://schemas.openxmlformats.org/presentationml/2006/main">
   <p:cSld>
     <p:spTree>
@@ -1804,166 +1968,6 @@
     <p:extLst>
       <p:ext uri="{BB962C8B-B14F-4D97-AF65-F5344CB8AC3E}">
         <p14:creationId xmlns:p14="http://schemas.microsoft.com/office/powerpoint/2010/main" val="2845172653"/>
-      </p:ext>
-    </p:extLst>
-  </p:cSld>
-  <p:clrMapOvr>
-    <a:masterClrMapping/>
-  </p:clrMapOvr>
-</p:notes>
-</file>
-
-<file path=ppt/notesSlides/notesSlide16.xml><?xml version="1.0" encoding="utf-8"?>
-<p:notes xmlns:a="http://schemas.openxmlformats.org/drawingml/2006/main" xmlns:r="http://schemas.openxmlformats.org/officeDocument/2006/relationships" xmlns:p="http://schemas.openxmlformats.org/presentationml/2006/main">
-  <p:cSld>
-    <p:spTree>
-      <p:nvGrpSpPr>
-        <p:cNvPr id="1" name=""/>
-        <p:cNvGrpSpPr/>
-        <p:nvPr/>
-      </p:nvGrpSpPr>
-      <p:grpSpPr>
-        <a:xfrm>
-          <a:off x="0" y="0"/>
-          <a:ext cx="0" cy="0"/>
-          <a:chOff x="0" y="0"/>
-          <a:chExt cx="0" cy="0"/>
-        </a:xfrm>
-      </p:grpSpPr>
-      <p:sp>
-        <p:nvSpPr>
-          <p:cNvPr id="2" name="Slide Image Placeholder 1"/>
-          <p:cNvSpPr>
-            <a:spLocks noGrp="1" noRot="1" noChangeAspect="1"/>
-          </p:cNvSpPr>
-          <p:nvPr>
-            <p:ph type="sldImg"/>
-          </p:nvPr>
-        </p:nvSpPr>
-        <p:spPr/>
-      </p:sp>
-      <p:sp>
-        <p:nvSpPr>
-          <p:cNvPr id="3" name="Notes Placeholder 2"/>
-          <p:cNvSpPr>
-            <a:spLocks noGrp="1"/>
-          </p:cNvSpPr>
-          <p:nvPr>
-            <p:ph type="body" idx="1"/>
-          </p:nvPr>
-        </p:nvSpPr>
-        <p:spPr/>
-        <p:txBody>
-          <a:bodyPr/>
-          <a:lstStyle/>
-          <a:p>
-            <a:pPr marL="0" indent="0">
-              <a:buFont typeface="Arial" panose="020B0604020202020204" pitchFamily="34" charset="0"/>
-              <a:buNone/>
-            </a:pPr>
-            <a:r>
-              <a:rPr lang="en-US" dirty="0"/>
-              <a:t>So this one</a:t>
-            </a:r>
-            <a:r>
-              <a:rPr lang="en-US" baseline="0" dirty="0"/>
-              <a:t> is maybe not so obvious.  But let me tell you about some s</a:t>
-            </a:r>
-            <a:r>
-              <a:rPr lang="en-US" dirty="0"/>
-              <a:t>neaky things that security folk</a:t>
-            </a:r>
-            <a:r>
-              <a:rPr lang="en-US" baseline="0" dirty="0"/>
-              <a:t> hate seeing:</a:t>
-            </a:r>
-            <a:endParaRPr lang="en-US" dirty="0"/>
-          </a:p>
-          <a:p>
-            <a:pPr marL="285750" indent="-285750">
-              <a:buFont typeface="Arial" panose="020B0604020202020204" pitchFamily="34" charset="0"/>
-              <a:buChar char="•"/>
-            </a:pPr>
-            <a:r>
-              <a:rPr lang="en-US" dirty="0"/>
-              <a:t>“elegant” </a:t>
-            </a:r>
-            <a:r>
-              <a:rPr lang="en-US" dirty="0">
-                <a:sym typeface="Wingdings" panose="05000000000000000000" pitchFamily="2" charset="2"/>
-              </a:rPr>
-              <a:t> “we didn’t handle any edge cases”</a:t>
-            </a:r>
-          </a:p>
-          <a:p>
-            <a:pPr marL="285750" indent="-285750">
-              <a:buFont typeface="Arial" panose="020B0604020202020204" pitchFamily="34" charset="0"/>
-              <a:buChar char="•"/>
-            </a:pPr>
-            <a:r>
-              <a:rPr lang="en-US" dirty="0">
-                <a:sym typeface="Wingdings" panose="05000000000000000000" pitchFamily="2" charset="2"/>
-              </a:rPr>
-              <a:t>“lightweight”   “we cut out all the input validation”</a:t>
-            </a:r>
-          </a:p>
-          <a:p>
-            <a:pPr marL="285750" indent="-285750">
-              <a:buFont typeface="Arial" panose="020B0604020202020204" pitchFamily="34" charset="0"/>
-              <a:buChar char="•"/>
-            </a:pPr>
-            <a:r>
-              <a:rPr lang="en-US" dirty="0">
-                <a:sym typeface="Wingdings" panose="05000000000000000000" pitchFamily="2" charset="2"/>
-              </a:rPr>
-              <a:t>“fast”  “we cut out all the error checking”</a:t>
-            </a:r>
-          </a:p>
-          <a:p>
-            <a:pPr marL="285750" indent="-285750">
-              <a:buFont typeface="Arial" panose="020B0604020202020204" pitchFamily="34" charset="0"/>
-              <a:buChar char="•"/>
-            </a:pPr>
-            <a:r>
-              <a:rPr lang="en-US" dirty="0">
-                <a:sym typeface="Wingdings" panose="05000000000000000000" pitchFamily="2" charset="2"/>
-              </a:rPr>
-              <a:t>“we wrote a new parser”  all of the above</a:t>
-            </a:r>
-          </a:p>
-          <a:p>
-            <a:endParaRPr lang="en-US" dirty="0"/>
-          </a:p>
-        </p:txBody>
-      </p:sp>
-      <p:sp>
-        <p:nvSpPr>
-          <p:cNvPr id="4" name="Slide Number Placeholder 3"/>
-          <p:cNvSpPr>
-            <a:spLocks noGrp="1"/>
-          </p:cNvSpPr>
-          <p:nvPr>
-            <p:ph type="sldNum" sz="quarter" idx="10"/>
-          </p:nvPr>
-        </p:nvSpPr>
-        <p:spPr/>
-        <p:txBody>
-          <a:bodyPr/>
-          <a:lstStyle/>
-          <a:p>
-            <a:fld id="{D61C8689-8455-3546-ADF9-3B7273760F66}" type="slidenum">
-              <a:rPr lang="en-US" smtClean="0"/>
-              <a:pPr/>
-              <a:t>18</a:t>
-            </a:fld>
-            <a:endParaRPr lang="en-US" dirty="0"/>
-          </a:p>
-        </p:txBody>
-      </p:sp>
-    </p:spTree>
-    <p:extLst>
-      <p:ext uri="{BB962C8B-B14F-4D97-AF65-F5344CB8AC3E}">
-        <p14:creationId xmlns:p14="http://schemas.microsoft.com/office/powerpoint/2010/main" val="149593433"/>
       </p:ext>
     </p:extLst>
   </p:cSld>
@@ -2017,6 +2021,166 @@
           <a:bodyPr/>
           <a:lstStyle/>
           <a:p>
+            <a:pPr marL="0" indent="0">
+              <a:buFont typeface="Arial" panose="020B0604020202020204" pitchFamily="34" charset="0"/>
+              <a:buNone/>
+            </a:pPr>
+            <a:r>
+              <a:rPr lang="en-US" dirty="0"/>
+              <a:t>So this one</a:t>
+            </a:r>
+            <a:r>
+              <a:rPr lang="en-US" baseline="0" dirty="0"/>
+              <a:t> is maybe not so obvious.  But let me tell you about some s</a:t>
+            </a:r>
+            <a:r>
+              <a:rPr lang="en-US" dirty="0"/>
+              <a:t>neaky things that security folk</a:t>
+            </a:r>
+            <a:r>
+              <a:rPr lang="en-US" baseline="0" dirty="0"/>
+              <a:t> hate seeing:</a:t>
+            </a:r>
+            <a:endParaRPr lang="en-US" dirty="0"/>
+          </a:p>
+          <a:p>
+            <a:pPr marL="285750" indent="-285750">
+              <a:buFont typeface="Arial" panose="020B0604020202020204" pitchFamily="34" charset="0"/>
+              <a:buChar char="•"/>
+            </a:pPr>
+            <a:r>
+              <a:rPr lang="en-US" dirty="0"/>
+              <a:t>“elegant” </a:t>
+            </a:r>
+            <a:r>
+              <a:rPr lang="en-US" dirty="0">
+                <a:sym typeface="Wingdings" panose="05000000000000000000" pitchFamily="2" charset="2"/>
+              </a:rPr>
+              <a:t> “we didn’t handle any edge cases”</a:t>
+            </a:r>
+          </a:p>
+          <a:p>
+            <a:pPr marL="285750" indent="-285750">
+              <a:buFont typeface="Arial" panose="020B0604020202020204" pitchFamily="34" charset="0"/>
+              <a:buChar char="•"/>
+            </a:pPr>
+            <a:r>
+              <a:rPr lang="en-US" dirty="0">
+                <a:sym typeface="Wingdings" panose="05000000000000000000" pitchFamily="2" charset="2"/>
+              </a:rPr>
+              <a:t>“lightweight”   “we cut out all the input validation”</a:t>
+            </a:r>
+          </a:p>
+          <a:p>
+            <a:pPr marL="285750" indent="-285750">
+              <a:buFont typeface="Arial" panose="020B0604020202020204" pitchFamily="34" charset="0"/>
+              <a:buChar char="•"/>
+            </a:pPr>
+            <a:r>
+              <a:rPr lang="en-US" dirty="0">
+                <a:sym typeface="Wingdings" panose="05000000000000000000" pitchFamily="2" charset="2"/>
+              </a:rPr>
+              <a:t>“fast”  “we cut out all the error checking”</a:t>
+            </a:r>
+          </a:p>
+          <a:p>
+            <a:pPr marL="285750" indent="-285750">
+              <a:buFont typeface="Arial" panose="020B0604020202020204" pitchFamily="34" charset="0"/>
+              <a:buChar char="•"/>
+            </a:pPr>
+            <a:r>
+              <a:rPr lang="en-US" dirty="0">
+                <a:sym typeface="Wingdings" panose="05000000000000000000" pitchFamily="2" charset="2"/>
+              </a:rPr>
+              <a:t>“we wrote a new parser”  all of the above</a:t>
+            </a:r>
+          </a:p>
+          <a:p>
+            <a:endParaRPr lang="en-US" dirty="0"/>
+          </a:p>
+        </p:txBody>
+      </p:sp>
+      <p:sp>
+        <p:nvSpPr>
+          <p:cNvPr id="4" name="Slide Number Placeholder 3"/>
+          <p:cNvSpPr>
+            <a:spLocks noGrp="1"/>
+          </p:cNvSpPr>
+          <p:nvPr>
+            <p:ph type="sldNum" sz="quarter" idx="10"/>
+          </p:nvPr>
+        </p:nvSpPr>
+        <p:spPr/>
+        <p:txBody>
+          <a:bodyPr/>
+          <a:lstStyle/>
+          <a:p>
+            <a:fld id="{D61C8689-8455-3546-ADF9-3B7273760F66}" type="slidenum">
+              <a:rPr lang="en-US" smtClean="0"/>
+              <a:pPr/>
+              <a:t>18</a:t>
+            </a:fld>
+            <a:endParaRPr lang="en-US" dirty="0"/>
+          </a:p>
+        </p:txBody>
+      </p:sp>
+    </p:spTree>
+    <p:extLst>
+      <p:ext uri="{BB962C8B-B14F-4D97-AF65-F5344CB8AC3E}">
+        <p14:creationId xmlns:p14="http://schemas.microsoft.com/office/powerpoint/2010/main" val="149593433"/>
+      </p:ext>
+    </p:extLst>
+  </p:cSld>
+  <p:clrMapOvr>
+    <a:masterClrMapping/>
+  </p:clrMapOvr>
+</p:notes>
+</file>
+
+<file path=ppt/notesSlides/notesSlide18.xml><?xml version="1.0" encoding="utf-8"?>
+<p:notes xmlns:a="http://schemas.openxmlformats.org/drawingml/2006/main" xmlns:r="http://schemas.openxmlformats.org/officeDocument/2006/relationships" xmlns:p="http://schemas.openxmlformats.org/presentationml/2006/main">
+  <p:cSld>
+    <p:spTree>
+      <p:nvGrpSpPr>
+        <p:cNvPr id="1" name=""/>
+        <p:cNvGrpSpPr/>
+        <p:nvPr/>
+      </p:nvGrpSpPr>
+      <p:grpSpPr>
+        <a:xfrm>
+          <a:off x="0" y="0"/>
+          <a:ext cx="0" cy="0"/>
+          <a:chOff x="0" y="0"/>
+          <a:chExt cx="0" cy="0"/>
+        </a:xfrm>
+      </p:grpSpPr>
+      <p:sp>
+        <p:nvSpPr>
+          <p:cNvPr id="2" name="Slide Image Placeholder 1"/>
+          <p:cNvSpPr>
+            <a:spLocks noGrp="1" noRot="1" noChangeAspect="1"/>
+          </p:cNvSpPr>
+          <p:nvPr>
+            <p:ph type="sldImg"/>
+          </p:nvPr>
+        </p:nvSpPr>
+        <p:spPr/>
+      </p:sp>
+      <p:sp>
+        <p:nvSpPr>
+          <p:cNvPr id="3" name="Notes Placeholder 2"/>
+          <p:cNvSpPr>
+            <a:spLocks noGrp="1"/>
+          </p:cNvSpPr>
+          <p:nvPr>
+            <p:ph type="body" idx="1"/>
+          </p:nvPr>
+        </p:nvSpPr>
+        <p:spPr/>
+        <p:txBody>
+          <a:bodyPr/>
+          <a:lstStyle/>
+          <a:p>
             <a:r>
               <a:rPr lang="en-US" dirty="0"/>
               <a:t>So,</a:t>
@@ -2069,7 +2233,7 @@
 </p:notes>
 </file>
 
-<file path=ppt/notesSlides/notesSlide18.xml><?xml version="1.0" encoding="utf-8"?>
+<file path=ppt/notesSlides/notesSlide19.xml><?xml version="1.0" encoding="utf-8"?>
 <p:notes xmlns:a="http://schemas.openxmlformats.org/drawingml/2006/main" xmlns:r="http://schemas.openxmlformats.org/officeDocument/2006/relationships" xmlns:p="http://schemas.openxmlformats.org/presentationml/2006/main" showMasterSp="0" showMasterPhAnim="0">
   <p:cSld>
     <p:spTree>
@@ -2227,99 +2391,6 @@
 </p:notes>
 </file>
 
-<file path=ppt/notesSlides/notesSlide19.xml><?xml version="1.0" encoding="utf-8"?>
-<p:notes xmlns:a="http://schemas.openxmlformats.org/drawingml/2006/main" xmlns:r="http://schemas.openxmlformats.org/officeDocument/2006/relationships" xmlns:p="http://schemas.openxmlformats.org/presentationml/2006/main">
-  <p:cSld>
-    <p:spTree>
-      <p:nvGrpSpPr>
-        <p:cNvPr id="1" name=""/>
-        <p:cNvGrpSpPr/>
-        <p:nvPr/>
-      </p:nvGrpSpPr>
-      <p:grpSpPr>
-        <a:xfrm>
-          <a:off x="0" y="0"/>
-          <a:ext cx="0" cy="0"/>
-          <a:chOff x="0" y="0"/>
-          <a:chExt cx="0" cy="0"/>
-        </a:xfrm>
-      </p:grpSpPr>
-      <p:sp>
-        <p:nvSpPr>
-          <p:cNvPr id="2" name="Slide Image Placeholder 1"/>
-          <p:cNvSpPr>
-            <a:spLocks noGrp="1" noRot="1" noChangeAspect="1"/>
-          </p:cNvSpPr>
-          <p:nvPr>
-            <p:ph type="sldImg"/>
-          </p:nvPr>
-        </p:nvSpPr>
-        <p:spPr/>
-      </p:sp>
-      <p:sp>
-        <p:nvSpPr>
-          <p:cNvPr id="3" name="Notes Placeholder 2"/>
-          <p:cNvSpPr>
-            <a:spLocks noGrp="1"/>
-          </p:cNvSpPr>
-          <p:nvPr>
-            <p:ph type="body" idx="1"/>
-          </p:nvPr>
-        </p:nvSpPr>
-        <p:spPr/>
-        <p:txBody>
-          <a:bodyPr/>
-          <a:lstStyle/>
-          <a:p>
-            <a:r>
-              <a:rPr lang="en-US" dirty="0"/>
-              <a:t>So here’s an</a:t>
-            </a:r>
-            <a:r>
-              <a:rPr lang="en-US" baseline="0" dirty="0"/>
-              <a:t> example of an active project.  I’m cheating a bit with this, since this is an Intel project so we know it meets our standards, but the point is that you want to see several active contributors and at least a few of them recently active if you’re expecting a whitelist rating</a:t>
-            </a:r>
-            <a:endParaRPr lang="en-US" dirty="0"/>
-          </a:p>
-        </p:txBody>
-      </p:sp>
-      <p:sp>
-        <p:nvSpPr>
-          <p:cNvPr id="4" name="Slide Number Placeholder 3"/>
-          <p:cNvSpPr>
-            <a:spLocks noGrp="1"/>
-          </p:cNvSpPr>
-          <p:nvPr>
-            <p:ph type="sldNum" sz="quarter" idx="10"/>
-          </p:nvPr>
-        </p:nvSpPr>
-        <p:spPr/>
-        <p:txBody>
-          <a:bodyPr/>
-          <a:lstStyle/>
-          <a:p>
-            <a:fld id="{D61C8689-8455-3546-ADF9-3B7273760F66}" type="slidenum">
-              <a:rPr lang="en-US" smtClean="0"/>
-              <a:pPr/>
-              <a:t>21</a:t>
-            </a:fld>
-            <a:endParaRPr lang="en-US" dirty="0"/>
-          </a:p>
-        </p:txBody>
-      </p:sp>
-    </p:spTree>
-    <p:extLst>
-      <p:ext uri="{BB962C8B-B14F-4D97-AF65-F5344CB8AC3E}">
-        <p14:creationId xmlns:p14="http://schemas.microsoft.com/office/powerpoint/2010/main" val="1659913343"/>
-      </p:ext>
-    </p:extLst>
-  </p:cSld>
-  <p:clrMapOvr>
-    <a:masterClrMapping/>
-  </p:clrMapOvr>
-</p:notes>
-</file>
-
 <file path=ppt/notesSlides/notesSlide2.xml><?xml version="1.0" encoding="utf-8"?>
 <p:notes xmlns:a="http://schemas.openxmlformats.org/drawingml/2006/main" xmlns:r="http://schemas.openxmlformats.org/officeDocument/2006/relationships" xmlns:p="http://schemas.openxmlformats.org/presentationml/2006/main">
   <p:cSld>
@@ -2365,19 +2436,36 @@
           <a:lstStyle/>
           <a:p>
             <a:r>
-              <a:rPr lang="en-US" baseline="0" dirty="0"/>
-              <a:t>But I’d like to help make it better. I want everyone to be even more awesome at using open source software, since it helps us achieve faster time to market and lets us “stand on the shoulders of giants” to reach new heights rather than redeveloping existing ideas.  I’m pretty passionate about it having been involved in open source for over 25 years.  </a:t>
-            </a:r>
-          </a:p>
-          <a:p>
-            <a:endParaRPr lang="en-US" baseline="0" dirty="0"/>
-          </a:p>
-          <a:p>
-            <a:r>
-              <a:rPr lang="en-US" baseline="0" dirty="0"/>
-              <a:t>And hopefully you’re all pretty passionate about shipping good quality software, which means good quality components.  </a:t>
-            </a:r>
+              <a:rPr lang="en-US" dirty="0"/>
+              <a:t>Okay, so that’s a lot of disheartening news. But it gets worse…</a:t>
+            </a:r>
+          </a:p>
+          <a:p>
             <a:endParaRPr lang="en-US" dirty="0"/>
+          </a:p>
+          <a:p>
+            <a:r>
+              <a:rPr lang="en-US" dirty="0"/>
+              <a:t>78% of the codebases examined contained at least one vulnerability, with an average 64 vulnerabilities per codebase. </a:t>
+            </a:r>
+          </a:p>
+          <a:p>
+            <a:endParaRPr lang="en-US" dirty="0"/>
+          </a:p>
+          <a:p>
+            <a:r>
+              <a:rPr lang="en-US" dirty="0"/>
+              <a:t>Open source usage is continuing to increase.</a:t>
+            </a:r>
+          </a:p>
+          <a:p>
+            <a:endParaRPr lang="en-US" dirty="0"/>
+          </a:p>
+          <a:p>
+            <a:r>
+              <a:rPr lang="en-US" dirty="0"/>
+              <a:t>The average percentage of codebase that was open source was 57% vs. 36% last year. Many applications now contain more open source than proprietary code.</a:t>
+            </a:r>
           </a:p>
         </p:txBody>
       </p:sp>
@@ -2399,7 +2487,7 @@
             <a:fld id="{D61C8689-8455-3546-ADF9-3B7273760F66}" type="slidenum">
               <a:rPr lang="en-US" smtClean="0"/>
               <a:pPr/>
-              <a:t>4</a:t>
+              <a:t>3</a:t>
             </a:fld>
             <a:endParaRPr lang="en-US" dirty="0"/>
           </a:p>
@@ -2408,7 +2496,7 @@
     </p:spTree>
     <p:extLst>
       <p:ext uri="{BB962C8B-B14F-4D97-AF65-F5344CB8AC3E}">
-        <p14:creationId xmlns:p14="http://schemas.microsoft.com/office/powerpoint/2010/main" val="3487614750"/>
+        <p14:creationId xmlns:p14="http://schemas.microsoft.com/office/powerpoint/2010/main" val="1330503285"/>
       </p:ext>
     </p:extLst>
   </p:cSld>
@@ -2419,6 +2507,99 @@
 </file>
 
 <file path=ppt/notesSlides/notesSlide20.xml><?xml version="1.0" encoding="utf-8"?>
+<p:notes xmlns:a="http://schemas.openxmlformats.org/drawingml/2006/main" xmlns:r="http://schemas.openxmlformats.org/officeDocument/2006/relationships" xmlns:p="http://schemas.openxmlformats.org/presentationml/2006/main">
+  <p:cSld>
+    <p:spTree>
+      <p:nvGrpSpPr>
+        <p:cNvPr id="1" name=""/>
+        <p:cNvGrpSpPr/>
+        <p:nvPr/>
+      </p:nvGrpSpPr>
+      <p:grpSpPr>
+        <a:xfrm>
+          <a:off x="0" y="0"/>
+          <a:ext cx="0" cy="0"/>
+          <a:chOff x="0" y="0"/>
+          <a:chExt cx="0" cy="0"/>
+        </a:xfrm>
+      </p:grpSpPr>
+      <p:sp>
+        <p:nvSpPr>
+          <p:cNvPr id="2" name="Slide Image Placeholder 1"/>
+          <p:cNvSpPr>
+            <a:spLocks noGrp="1" noRot="1" noChangeAspect="1"/>
+          </p:cNvSpPr>
+          <p:nvPr>
+            <p:ph type="sldImg"/>
+          </p:nvPr>
+        </p:nvSpPr>
+        <p:spPr/>
+      </p:sp>
+      <p:sp>
+        <p:nvSpPr>
+          <p:cNvPr id="3" name="Notes Placeholder 2"/>
+          <p:cNvSpPr>
+            <a:spLocks noGrp="1"/>
+          </p:cNvSpPr>
+          <p:nvPr>
+            <p:ph type="body" idx="1"/>
+          </p:nvPr>
+        </p:nvSpPr>
+        <p:spPr/>
+        <p:txBody>
+          <a:bodyPr/>
+          <a:lstStyle/>
+          <a:p>
+            <a:r>
+              <a:rPr lang="en-US" dirty="0"/>
+              <a:t>So here’s an</a:t>
+            </a:r>
+            <a:r>
+              <a:rPr lang="en-US" baseline="0" dirty="0"/>
+              <a:t> example of an active project.  I’m cheating a bit with this, since this is an Intel project so we know it meets our standards, but the point is that you want to see several active contributors and at least a few of them recently active if you’re expecting a whitelist rating</a:t>
+            </a:r>
+            <a:endParaRPr lang="en-US" dirty="0"/>
+          </a:p>
+        </p:txBody>
+      </p:sp>
+      <p:sp>
+        <p:nvSpPr>
+          <p:cNvPr id="4" name="Slide Number Placeholder 3"/>
+          <p:cNvSpPr>
+            <a:spLocks noGrp="1"/>
+          </p:cNvSpPr>
+          <p:nvPr>
+            <p:ph type="sldNum" sz="quarter" idx="10"/>
+          </p:nvPr>
+        </p:nvSpPr>
+        <p:spPr/>
+        <p:txBody>
+          <a:bodyPr/>
+          <a:lstStyle/>
+          <a:p>
+            <a:fld id="{D61C8689-8455-3546-ADF9-3B7273760F66}" type="slidenum">
+              <a:rPr lang="en-US" smtClean="0"/>
+              <a:pPr/>
+              <a:t>21</a:t>
+            </a:fld>
+            <a:endParaRPr lang="en-US" dirty="0"/>
+          </a:p>
+        </p:txBody>
+      </p:sp>
+    </p:spTree>
+    <p:extLst>
+      <p:ext uri="{BB962C8B-B14F-4D97-AF65-F5344CB8AC3E}">
+        <p14:creationId xmlns:p14="http://schemas.microsoft.com/office/powerpoint/2010/main" val="1659913343"/>
+      </p:ext>
+    </p:extLst>
+  </p:cSld>
+  <p:clrMapOvr>
+    <a:masterClrMapping/>
+  </p:clrMapOvr>
+</p:notes>
+</file>
+
+<file path=ppt/notesSlides/notesSlide21.xml><?xml version="1.0" encoding="utf-8"?>
 <p:notes xmlns:a="http://schemas.openxmlformats.org/drawingml/2006/main" xmlns:r="http://schemas.openxmlformats.org/officeDocument/2006/relationships" xmlns:p="http://schemas.openxmlformats.org/presentationml/2006/main" showMasterSp="0" showMasterPhAnim="0">
   <p:cSld>
     <p:spTree>
@@ -2576,7 +2757,7 @@
 </p:notes>
 </file>
 
-<file path=ppt/notesSlides/notesSlide21.xml><?xml version="1.0" encoding="utf-8"?>
+<file path=ppt/notesSlides/notesSlide22.xml><?xml version="1.0" encoding="utf-8"?>
 <p:notes xmlns:a="http://schemas.openxmlformats.org/drawingml/2006/main" xmlns:r="http://schemas.openxmlformats.org/officeDocument/2006/relationships" xmlns:p="http://schemas.openxmlformats.org/presentationml/2006/main">
   <p:cSld>
     <p:spTree>
@@ -2672,7 +2853,7 @@
 </p:notes>
 </file>
 
-<file path=ppt/notesSlides/notesSlide22.xml><?xml version="1.0" encoding="utf-8"?>
+<file path=ppt/notesSlides/notesSlide23.xml><?xml version="1.0" encoding="utf-8"?>
 <p:notes xmlns:a="http://schemas.openxmlformats.org/drawingml/2006/main" xmlns:r="http://schemas.openxmlformats.org/officeDocument/2006/relationships" xmlns:p="http://schemas.openxmlformats.org/presentationml/2006/main" showMasterSp="0" showMasterPhAnim="0">
   <p:cSld>
     <p:spTree>
@@ -2838,7 +3019,7 @@
 </p:notes>
 </file>
 
-<file path=ppt/notesSlides/notesSlide23.xml><?xml version="1.0" encoding="utf-8"?>
+<file path=ppt/notesSlides/notesSlide24.xml><?xml version="1.0" encoding="utf-8"?>
 <p:notes xmlns:a="http://schemas.openxmlformats.org/drawingml/2006/main" xmlns:r="http://schemas.openxmlformats.org/officeDocument/2006/relationships" xmlns:p="http://schemas.openxmlformats.org/presentationml/2006/main" showMasterSp="0" showMasterPhAnim="0">
   <p:cSld>
     <p:spTree>
@@ -3005,99 +3186,6 @@
 </p:notes>
 </file>
 
-<file path=ppt/notesSlides/notesSlide24.xml><?xml version="1.0" encoding="utf-8"?>
-<p:notes xmlns:a="http://schemas.openxmlformats.org/drawingml/2006/main" xmlns:r="http://schemas.openxmlformats.org/officeDocument/2006/relationships" xmlns:p="http://schemas.openxmlformats.org/presentationml/2006/main">
-  <p:cSld>
-    <p:spTree>
-      <p:nvGrpSpPr>
-        <p:cNvPr id="1" name=""/>
-        <p:cNvGrpSpPr/>
-        <p:nvPr/>
-      </p:nvGrpSpPr>
-      <p:grpSpPr>
-        <a:xfrm>
-          <a:off x="0" y="0"/>
-          <a:ext cx="0" cy="0"/>
-          <a:chOff x="0" y="0"/>
-          <a:chExt cx="0" cy="0"/>
-        </a:xfrm>
-      </p:grpSpPr>
-      <p:sp>
-        <p:nvSpPr>
-          <p:cNvPr id="2" name="Slide Image Placeholder 1"/>
-          <p:cNvSpPr>
-            <a:spLocks noGrp="1" noRot="1" noChangeAspect="1"/>
-          </p:cNvSpPr>
-          <p:nvPr>
-            <p:ph type="sldImg"/>
-          </p:nvPr>
-        </p:nvSpPr>
-        <p:spPr/>
-      </p:sp>
-      <p:sp>
-        <p:nvSpPr>
-          <p:cNvPr id="3" name="Notes Placeholder 2"/>
-          <p:cNvSpPr>
-            <a:spLocks noGrp="1"/>
-          </p:cNvSpPr>
-          <p:nvPr>
-            <p:ph type="body" idx="1"/>
-          </p:nvPr>
-        </p:nvSpPr>
-        <p:spPr/>
-        <p:txBody>
-          <a:bodyPr/>
-          <a:lstStyle/>
-          <a:p>
-            <a:r>
-              <a:rPr lang="en-US" dirty="0"/>
-              <a:t>What you’re more likely to find is nothing.</a:t>
-            </a:r>
-            <a:r>
-              <a:rPr lang="en-US" baseline="0" dirty="0"/>
-              <a:t>  No policy, no evidence. This can mean that they haven’t thought about security at all, which isn’t exactly a point in their favor.</a:t>
-            </a:r>
-            <a:endParaRPr lang="en-US" dirty="0"/>
-          </a:p>
-        </p:txBody>
-      </p:sp>
-      <p:sp>
-        <p:nvSpPr>
-          <p:cNvPr id="4" name="Slide Number Placeholder 3"/>
-          <p:cNvSpPr>
-            <a:spLocks noGrp="1"/>
-          </p:cNvSpPr>
-          <p:nvPr>
-            <p:ph type="sldNum" sz="quarter" idx="10"/>
-          </p:nvPr>
-        </p:nvSpPr>
-        <p:spPr/>
-        <p:txBody>
-          <a:bodyPr/>
-          <a:lstStyle/>
-          <a:p>
-            <a:fld id="{D61C8689-8455-3546-ADF9-3B7273760F66}" type="slidenum">
-              <a:rPr lang="en-US" smtClean="0"/>
-              <a:pPr/>
-              <a:t>26</a:t>
-            </a:fld>
-            <a:endParaRPr lang="en-US" dirty="0"/>
-          </a:p>
-        </p:txBody>
-      </p:sp>
-    </p:spTree>
-    <p:extLst>
-      <p:ext uri="{BB962C8B-B14F-4D97-AF65-F5344CB8AC3E}">
-        <p14:creationId xmlns:p14="http://schemas.microsoft.com/office/powerpoint/2010/main" val="3607932924"/>
-      </p:ext>
-    </p:extLst>
-  </p:cSld>
-  <p:clrMapOvr>
-    <a:masterClrMapping/>
-  </p:clrMapOvr>
-</p:notes>
-</file>
-
 <file path=ppt/notesSlides/notesSlide25.xml><?xml version="1.0" encoding="utf-8"?>
 <p:notes xmlns:a="http://schemas.openxmlformats.org/drawingml/2006/main" xmlns:r="http://schemas.openxmlformats.org/officeDocument/2006/relationships" xmlns:p="http://schemas.openxmlformats.org/presentationml/2006/main">
   <p:cSld>
@@ -3144,19 +3232,11 @@
           <a:p>
             <a:r>
               <a:rPr lang="en-US" dirty="0"/>
-              <a:t>And</a:t>
+              <a:t>What you’re more likely to find is nothing.</a:t>
             </a:r>
             <a:r>
               <a:rPr lang="en-US" baseline="0" dirty="0"/>
-              <a:t> if you can’t find much, you should probably just check their bug tracker and see how much comes up if you search for “security.”  A</a:t>
-            </a:r>
-            <a:r>
-              <a:rPr lang="en-US" dirty="0"/>
-              <a:t>nother thing you might see is</a:t>
-            </a:r>
-            <a:r>
-              <a:rPr lang="en-US" baseline="0" dirty="0"/>
-              <a:t> that they have multiple unfixed security bugs.  Again, context matters: sometimes they aren’t real bugs, sometimes the risks are low and the project doesn’t have resources to fix, but if you see this you should go read through all those bugs and see if any of them affect your product.”  </a:t>
+              <a:t>  No policy, no evidence. This can mean that they haven’t thought about security at all, which isn’t exactly a point in their favor.</a:t>
             </a:r>
             <a:endParaRPr lang="en-US" dirty="0"/>
           </a:p>
@@ -3180,7 +3260,7 @@
             <a:fld id="{D61C8689-8455-3546-ADF9-3B7273760F66}" type="slidenum">
               <a:rPr lang="en-US" smtClean="0"/>
               <a:pPr/>
-              <a:t>27</a:t>
+              <a:t>26</a:t>
             </a:fld>
             <a:endParaRPr lang="en-US" dirty="0"/>
           </a:p>
@@ -3189,7 +3269,7 @@
     </p:spTree>
     <p:extLst>
       <p:ext uri="{BB962C8B-B14F-4D97-AF65-F5344CB8AC3E}">
-        <p14:creationId xmlns:p14="http://schemas.microsoft.com/office/powerpoint/2010/main" val="2379591025"/>
+        <p14:creationId xmlns:p14="http://schemas.microsoft.com/office/powerpoint/2010/main" val="3607932924"/>
       </p:ext>
     </p:extLst>
   </p:cSld>
@@ -3243,19 +3323,21 @@
           <a:bodyPr/>
           <a:lstStyle/>
           <a:p>
-            <a:pPr lvl="0" rtl="0">
-              <a:spcBef>
-                <a:spcPts val="0"/>
-              </a:spcBef>
-              <a:buNone/>
-            </a:pPr>
             <a:r>
               <a:rPr lang="en-US" dirty="0"/>
-              <a:t>And one last one to note is that good security reporting doesn’t actually</a:t>
+              <a:t>And</a:t>
             </a:r>
             <a:r>
               <a:rPr lang="en-US" baseline="0" dirty="0"/>
-              <a:t> guarantee good action.  You’re probably not going to know which companies and groups have good reputations, but I want you to be aware that this is an issue that could come up.</a:t>
+              <a:t> if you can’t find much, you should probably just check their bug tracker and see how much comes up if you search for “security.”  A</a:t>
+            </a:r>
+            <a:r>
+              <a:rPr lang="en-US" dirty="0"/>
+              <a:t>nother thing you might see is</a:t>
+            </a:r>
+            <a:r>
+              <a:rPr lang="en-US" baseline="0" dirty="0"/>
+              <a:t> that they have multiple unfixed security bugs.  Again, context matters: sometimes they aren’t real bugs, sometimes the risks are low and the project doesn’t have resources to fix, but if you see this you should go read through all those bugs and see if any of them affect your product.”  </a:t>
             </a:r>
             <a:endParaRPr lang="en-US" dirty="0"/>
           </a:p>
@@ -3268,7 +3350,7 @@
             <a:spLocks noGrp="1"/>
           </p:cNvSpPr>
           <p:nvPr>
-            <p:ph type="sldNum" sz="quarter" idx="5"/>
+            <p:ph type="sldNum" sz="quarter" idx="10"/>
           </p:nvPr>
         </p:nvSpPr>
         <p:spPr/>
@@ -3277,21 +3359,18 @@
           <a:lstStyle/>
           <a:p>
             <a:fld id="{D61C8689-8455-3546-ADF9-3B7273760F66}" type="slidenum">
-              <a:rPr lang="en-US" smtClean="0">
-                <a:effectLst/>
-              </a:rPr>
-              <a:t>28</a:t>
+              <a:rPr lang="en-US" smtClean="0"/>
+              <a:pPr/>
+              <a:t>27</a:t>
             </a:fld>
-            <a:endParaRPr lang="en-US">
-              <a:effectLst/>
-            </a:endParaRPr>
+            <a:endParaRPr lang="en-US" dirty="0"/>
           </a:p>
         </p:txBody>
       </p:sp>
     </p:spTree>
     <p:extLst>
       <p:ext uri="{BB962C8B-B14F-4D97-AF65-F5344CB8AC3E}">
-        <p14:creationId xmlns:p14="http://schemas.microsoft.com/office/powerpoint/2010/main" val="2047405617"/>
+        <p14:creationId xmlns:p14="http://schemas.microsoft.com/office/powerpoint/2010/main" val="2379591025"/>
       </p:ext>
     </p:extLst>
   </p:cSld>
@@ -3345,21 +3424,19 @@
           <a:bodyPr/>
           <a:lstStyle/>
           <a:p>
+            <a:pPr lvl="0" rtl="0">
+              <a:spcBef>
+                <a:spcPts val="0"/>
+              </a:spcBef>
+              <a:buNone/>
+            </a:pPr>
             <a:r>
               <a:rPr lang="en-US" dirty="0"/>
-              <a:t>Zooming</a:t>
+              <a:t>And one last one to note is that good security reporting doesn’t actually</a:t>
             </a:r>
             <a:r>
               <a:rPr lang="en-US" baseline="0" dirty="0"/>
-              <a:t> in so you can see it, you can see that the person who triaged this bug said it wasn’t an issue.  But thanks to the work of our intern, John Anderson, who provided additional information and a proof of concept, they’ve now acknowledged this as a real issue and issued a public vulnerability number for it and getting it fixed.  But without persistence, this security issue would have still been an issue in </a:t>
-            </a:r>
-            <a:r>
-              <a:rPr lang="en-US" baseline="0" dirty="0" err="1"/>
-              <a:t>virtualbox</a:t>
-            </a:r>
-            <a:r>
-              <a:rPr lang="en-US" baseline="0" dirty="0"/>
-              <a:t> indefinitely!</a:t>
+              <a:t> guarantee good action.  You’re probably not going to know which companies and groups have good reputations, but I want you to be aware that this is an issue that could come up.</a:t>
             </a:r>
             <a:endParaRPr lang="en-US" dirty="0"/>
           </a:p>
@@ -3372,7 +3449,7 @@
             <a:spLocks noGrp="1"/>
           </p:cNvSpPr>
           <p:nvPr>
-            <p:ph type="sldNum" sz="quarter" idx="10"/>
+            <p:ph type="sldNum" sz="quarter" idx="5"/>
           </p:nvPr>
         </p:nvSpPr>
         <p:spPr/>
@@ -3381,18 +3458,21 @@
           <a:lstStyle/>
           <a:p>
             <a:fld id="{D61C8689-8455-3546-ADF9-3B7273760F66}" type="slidenum">
-              <a:rPr lang="en-US" smtClean="0"/>
-              <a:pPr/>
-              <a:t>29</a:t>
+              <a:rPr lang="en-US" smtClean="0">
+                <a:effectLst/>
+              </a:rPr>
+              <a:t>28</a:t>
             </a:fld>
-            <a:endParaRPr lang="en-US" dirty="0"/>
+            <a:endParaRPr lang="en-US">
+              <a:effectLst/>
+            </a:endParaRPr>
           </a:p>
         </p:txBody>
       </p:sp>
     </p:spTree>
     <p:extLst>
       <p:ext uri="{BB962C8B-B14F-4D97-AF65-F5344CB8AC3E}">
-        <p14:creationId xmlns:p14="http://schemas.microsoft.com/office/powerpoint/2010/main" val="1636340827"/>
+        <p14:creationId xmlns:p14="http://schemas.microsoft.com/office/powerpoint/2010/main" val="2047405617"/>
       </p:ext>
     </p:extLst>
   </p:cSld>
@@ -3446,6 +3526,107 @@
           <a:bodyPr/>
           <a:lstStyle/>
           <a:p>
+            <a:r>
+              <a:rPr lang="en-US" dirty="0"/>
+              <a:t>Zooming</a:t>
+            </a:r>
+            <a:r>
+              <a:rPr lang="en-US" baseline="0" dirty="0"/>
+              <a:t> in so you can see it, you can see that the person who triaged this bug said it wasn’t an issue.  But thanks to the work of our intern, John Anderson, who provided additional information and a proof of concept, they’ve now acknowledged this as a real issue and issued a public vulnerability number for it and getting it fixed.  But without persistence, this security issue would have still been an issue in </a:t>
+            </a:r>
+            <a:r>
+              <a:rPr lang="en-US" baseline="0" dirty="0" err="1"/>
+              <a:t>virtualbox</a:t>
+            </a:r>
+            <a:r>
+              <a:rPr lang="en-US" baseline="0" dirty="0"/>
+              <a:t> indefinitely!</a:t>
+            </a:r>
+            <a:endParaRPr lang="en-US" dirty="0"/>
+          </a:p>
+        </p:txBody>
+      </p:sp>
+      <p:sp>
+        <p:nvSpPr>
+          <p:cNvPr id="4" name="Slide Number Placeholder 3"/>
+          <p:cNvSpPr>
+            <a:spLocks noGrp="1"/>
+          </p:cNvSpPr>
+          <p:nvPr>
+            <p:ph type="sldNum" sz="quarter" idx="10"/>
+          </p:nvPr>
+        </p:nvSpPr>
+        <p:spPr/>
+        <p:txBody>
+          <a:bodyPr/>
+          <a:lstStyle/>
+          <a:p>
+            <a:fld id="{D61C8689-8455-3546-ADF9-3B7273760F66}" type="slidenum">
+              <a:rPr lang="en-US" smtClean="0"/>
+              <a:pPr/>
+              <a:t>29</a:t>
+            </a:fld>
+            <a:endParaRPr lang="en-US" dirty="0"/>
+          </a:p>
+        </p:txBody>
+      </p:sp>
+    </p:spTree>
+    <p:extLst>
+      <p:ext uri="{BB962C8B-B14F-4D97-AF65-F5344CB8AC3E}">
+        <p14:creationId xmlns:p14="http://schemas.microsoft.com/office/powerpoint/2010/main" val="1636340827"/>
+      </p:ext>
+    </p:extLst>
+  </p:cSld>
+  <p:clrMapOvr>
+    <a:masterClrMapping/>
+  </p:clrMapOvr>
+</p:notes>
+</file>
+
+<file path=ppt/notesSlides/notesSlide29.xml><?xml version="1.0" encoding="utf-8"?>
+<p:notes xmlns:a="http://schemas.openxmlformats.org/drawingml/2006/main" xmlns:r="http://schemas.openxmlformats.org/officeDocument/2006/relationships" xmlns:p="http://schemas.openxmlformats.org/presentationml/2006/main">
+  <p:cSld>
+    <p:spTree>
+      <p:nvGrpSpPr>
+        <p:cNvPr id="1" name=""/>
+        <p:cNvGrpSpPr/>
+        <p:nvPr/>
+      </p:nvGrpSpPr>
+      <p:grpSpPr>
+        <a:xfrm>
+          <a:off x="0" y="0"/>
+          <a:ext cx="0" cy="0"/>
+          <a:chOff x="0" y="0"/>
+          <a:chExt cx="0" cy="0"/>
+        </a:xfrm>
+      </p:grpSpPr>
+      <p:sp>
+        <p:nvSpPr>
+          <p:cNvPr id="2" name="Slide Image Placeholder 1"/>
+          <p:cNvSpPr>
+            <a:spLocks noGrp="1" noRot="1" noChangeAspect="1"/>
+          </p:cNvSpPr>
+          <p:nvPr>
+            <p:ph type="sldImg"/>
+          </p:nvPr>
+        </p:nvSpPr>
+        <p:spPr/>
+      </p:sp>
+      <p:sp>
+        <p:nvSpPr>
+          <p:cNvPr id="3" name="Notes Placeholder 2"/>
+          <p:cNvSpPr>
+            <a:spLocks noGrp="1"/>
+          </p:cNvSpPr>
+          <p:nvPr>
+            <p:ph type="body" idx="1"/>
+          </p:nvPr>
+        </p:nvSpPr>
+        <p:spPr/>
+        <p:txBody>
+          <a:bodyPr/>
+          <a:lstStyle/>
+          <a:p>
             <a:pPr lvl="0">
               <a:spcBef>
                 <a:spcPts val="0"/>
@@ -3504,7 +3685,105 @@
 </p:notes>
 </file>
 
-<file path=ppt/notesSlides/notesSlide29.xml><?xml version="1.0" encoding="utf-8"?>
+<file path=ppt/notesSlides/notesSlide3.xml><?xml version="1.0" encoding="utf-8"?>
+<p:notes xmlns:a="http://schemas.openxmlformats.org/drawingml/2006/main" xmlns:r="http://schemas.openxmlformats.org/officeDocument/2006/relationships" xmlns:p="http://schemas.openxmlformats.org/presentationml/2006/main">
+  <p:cSld>
+    <p:spTree>
+      <p:nvGrpSpPr>
+        <p:cNvPr id="1" name=""/>
+        <p:cNvGrpSpPr/>
+        <p:nvPr/>
+      </p:nvGrpSpPr>
+      <p:grpSpPr>
+        <a:xfrm>
+          <a:off x="0" y="0"/>
+          <a:ext cx="0" cy="0"/>
+          <a:chOff x="0" y="0"/>
+          <a:chExt cx="0" cy="0"/>
+        </a:xfrm>
+      </p:grpSpPr>
+      <p:sp>
+        <p:nvSpPr>
+          <p:cNvPr id="2" name="Slide Image Placeholder 1"/>
+          <p:cNvSpPr>
+            <a:spLocks noGrp="1" noRot="1" noChangeAspect="1"/>
+          </p:cNvSpPr>
+          <p:nvPr>
+            <p:ph type="sldImg"/>
+          </p:nvPr>
+        </p:nvSpPr>
+        <p:spPr/>
+      </p:sp>
+      <p:sp>
+        <p:nvSpPr>
+          <p:cNvPr id="3" name="Notes Placeholder 2"/>
+          <p:cNvSpPr>
+            <a:spLocks noGrp="1"/>
+          </p:cNvSpPr>
+          <p:nvPr>
+            <p:ph type="body" idx="1"/>
+          </p:nvPr>
+        </p:nvSpPr>
+        <p:spPr/>
+        <p:txBody>
+          <a:bodyPr/>
+          <a:lstStyle/>
+          <a:p>
+            <a:r>
+              <a:rPr lang="en-US" baseline="0" dirty="0"/>
+              <a:t>But I’d like to help make it better. I want everyone to be even more awesome at using open source software, since it helps us achieve faster time to market and lets us “stand on the shoulders of giants” to reach new heights rather than redeveloping existing ideas.  I’m pretty passionate about it having been involved in open source for over 25 years.  </a:t>
+            </a:r>
+          </a:p>
+          <a:p>
+            <a:endParaRPr lang="en-US" baseline="0" dirty="0"/>
+          </a:p>
+          <a:p>
+            <a:r>
+              <a:rPr lang="en-US" baseline="0" dirty="0"/>
+              <a:t>And hopefully you’re all pretty passionate about shipping good quality software, which means good quality components.  </a:t>
+            </a:r>
+            <a:endParaRPr lang="en-US" dirty="0"/>
+          </a:p>
+        </p:txBody>
+      </p:sp>
+      <p:sp>
+        <p:nvSpPr>
+          <p:cNvPr id="4" name="Slide Number Placeholder 3"/>
+          <p:cNvSpPr>
+            <a:spLocks noGrp="1"/>
+          </p:cNvSpPr>
+          <p:nvPr>
+            <p:ph type="sldNum" sz="quarter" idx="10"/>
+          </p:nvPr>
+        </p:nvSpPr>
+        <p:spPr/>
+        <p:txBody>
+          <a:bodyPr/>
+          <a:lstStyle/>
+          <a:p>
+            <a:fld id="{D61C8689-8455-3546-ADF9-3B7273760F66}" type="slidenum">
+              <a:rPr lang="en-US" smtClean="0"/>
+              <a:pPr/>
+              <a:t>4</a:t>
+            </a:fld>
+            <a:endParaRPr lang="en-US" dirty="0"/>
+          </a:p>
+        </p:txBody>
+      </p:sp>
+    </p:spTree>
+    <p:extLst>
+      <p:ext uri="{BB962C8B-B14F-4D97-AF65-F5344CB8AC3E}">
+        <p14:creationId xmlns:p14="http://schemas.microsoft.com/office/powerpoint/2010/main" val="3487614750"/>
+      </p:ext>
+    </p:extLst>
+  </p:cSld>
+  <p:clrMapOvr>
+    <a:masterClrMapping/>
+  </p:clrMapOvr>
+</p:notes>
+</file>
+
+<file path=ppt/notesSlides/notesSlide30.xml><?xml version="1.0" encoding="utf-8"?>
 <p:notes xmlns:a="http://schemas.openxmlformats.org/drawingml/2006/main" xmlns:r="http://schemas.openxmlformats.org/officeDocument/2006/relationships" xmlns:p="http://schemas.openxmlformats.org/presentationml/2006/main" showMasterSp="0" showMasterPhAnim="0">
   <p:cSld>
     <p:spTree>
@@ -3670,228 +3949,7 @@
 </p:notes>
 </file>
 
-<file path=ppt/notesSlides/notesSlide3.xml><?xml version="1.0" encoding="utf-8"?>
-<p:notes xmlns:a="http://schemas.openxmlformats.org/drawingml/2006/main" xmlns:r="http://schemas.openxmlformats.org/officeDocument/2006/relationships" xmlns:p="http://schemas.openxmlformats.org/presentationml/2006/main">
-  <p:cSld>
-    <p:spTree>
-      <p:nvGrpSpPr>
-        <p:cNvPr id="1" name=""/>
-        <p:cNvGrpSpPr/>
-        <p:nvPr/>
-      </p:nvGrpSpPr>
-      <p:grpSpPr>
-        <a:xfrm>
-          <a:off x="0" y="0"/>
-          <a:ext cx="0" cy="0"/>
-          <a:chOff x="0" y="0"/>
-          <a:chExt cx="0" cy="0"/>
-        </a:xfrm>
-      </p:grpSpPr>
-      <p:sp>
-        <p:nvSpPr>
-          <p:cNvPr id="2" name="Slide Image Placeholder 1"/>
-          <p:cNvSpPr>
-            <a:spLocks noGrp="1" noRot="1" noChangeAspect="1"/>
-          </p:cNvSpPr>
-          <p:nvPr>
-            <p:ph type="sldImg"/>
-          </p:nvPr>
-        </p:nvSpPr>
-        <p:spPr/>
-      </p:sp>
-      <p:sp>
-        <p:nvSpPr>
-          <p:cNvPr id="3" name="Notes Placeholder 2"/>
-          <p:cNvSpPr>
-            <a:spLocks noGrp="1"/>
-          </p:cNvSpPr>
-          <p:nvPr>
-            <p:ph type="body" idx="1"/>
-          </p:nvPr>
-        </p:nvSpPr>
-        <p:spPr/>
-        <p:txBody>
-          <a:bodyPr/>
-          <a:lstStyle/>
-          <a:p>
-            <a:pPr lvl="0" rtl="0">
-              <a:spcBef>
-                <a:spcPts val="0"/>
-              </a:spcBef>
-              <a:buNone/>
-            </a:pPr>
-            <a:r>
-              <a:rPr lang="en-US" dirty="0"/>
-              <a:t>Engineers</a:t>
-            </a:r>
-            <a:r>
-              <a:rPr lang="en-US" baseline="0" dirty="0"/>
-              <a:t> aren’t choosing bad packages because they’re malicious or stupid, they’re choosing them because they’ve got other metrics in mind:</a:t>
-            </a:r>
-            <a:endParaRPr lang="en-US" dirty="0"/>
-          </a:p>
-          <a:p>
-            <a:pPr marL="457200" lvl="0" indent="-228600" rtl="0">
-              <a:spcBef>
-                <a:spcPts val="0"/>
-              </a:spcBef>
-              <a:buClr>
-                <a:schemeClr val="dk2"/>
-              </a:buClr>
-              <a:buChar char="●"/>
-            </a:pPr>
-            <a:r>
-              <a:rPr lang="en-US" dirty="0">
-                <a:solidFill>
-                  <a:schemeClr val="dk2"/>
-                </a:solidFill>
-              </a:rPr>
-              <a:t>Does it meet our needs now and will it do so in the future?</a:t>
-            </a:r>
-          </a:p>
-          <a:p>
-            <a:pPr marL="457200" lvl="0" indent="-228600" rtl="0">
-              <a:spcBef>
-                <a:spcPts val="0"/>
-              </a:spcBef>
-              <a:buClr>
-                <a:schemeClr val="dk2"/>
-              </a:buClr>
-              <a:buChar char="●"/>
-            </a:pPr>
-            <a:r>
-              <a:rPr lang="en-US" dirty="0">
-                <a:solidFill>
-                  <a:schemeClr val="dk2"/>
-                </a:solidFill>
-              </a:rPr>
-              <a:t>Does it meet our licensing requirements?</a:t>
-            </a:r>
-          </a:p>
-          <a:p>
-            <a:pPr marL="457200" lvl="0" indent="-228600" rtl="0">
-              <a:spcBef>
-                <a:spcPts val="0"/>
-              </a:spcBef>
-              <a:buClr>
-                <a:schemeClr val="dk2"/>
-              </a:buClr>
-              <a:buChar char="●"/>
-            </a:pPr>
-            <a:r>
-              <a:rPr lang="en-US" dirty="0">
-                <a:solidFill>
-                  <a:schemeClr val="dk2"/>
-                </a:solidFill>
-              </a:rPr>
-              <a:t>It is small enough for our</a:t>
-            </a:r>
-            <a:r>
-              <a:rPr lang="en-US" baseline="0" dirty="0">
-                <a:solidFill>
-                  <a:schemeClr val="dk2"/>
-                </a:solidFill>
-              </a:rPr>
-              <a:t> desired footprint?</a:t>
-            </a:r>
-          </a:p>
-          <a:p>
-            <a:pPr marL="457200" lvl="0" indent="-228600" rtl="0">
-              <a:spcBef>
-                <a:spcPts val="0"/>
-              </a:spcBef>
-              <a:buClr>
-                <a:schemeClr val="dk2"/>
-              </a:buClr>
-              <a:buChar char="●"/>
-            </a:pPr>
-            <a:r>
-              <a:rPr lang="en-US" baseline="0" dirty="0">
-                <a:solidFill>
-                  <a:schemeClr val="dk2"/>
-                </a:solidFill>
-              </a:rPr>
-              <a:t>Is it what others in the industry are using?</a:t>
-            </a:r>
-            <a:endParaRPr lang="en-US" dirty="0">
-              <a:solidFill>
-                <a:schemeClr val="dk2"/>
-              </a:solidFill>
-            </a:endParaRPr>
-          </a:p>
-          <a:p>
-            <a:pPr marL="457200" lvl="0" indent="-228600" rtl="0">
-              <a:spcBef>
-                <a:spcPts val="0"/>
-              </a:spcBef>
-              <a:buClr>
-                <a:schemeClr val="dk2"/>
-              </a:buClr>
-              <a:buChar char="●"/>
-            </a:pPr>
-            <a:r>
-              <a:rPr lang="en-US" dirty="0">
-                <a:solidFill>
-                  <a:schemeClr val="dk2"/>
-                </a:solidFill>
-              </a:rPr>
-              <a:t>Does</a:t>
-            </a:r>
-            <a:r>
-              <a:rPr lang="en-US" baseline="0" dirty="0">
-                <a:solidFill>
-                  <a:schemeClr val="dk2"/>
-                </a:solidFill>
-              </a:rPr>
-              <a:t> it have a good tutorial so we can get someone ramped up to integrate it quickly?</a:t>
-            </a:r>
-          </a:p>
-          <a:p>
-            <a:endParaRPr lang="en-US" dirty="0"/>
-          </a:p>
-        </p:txBody>
-      </p:sp>
-      <p:sp>
-        <p:nvSpPr>
-          <p:cNvPr id="4" name="Slide Number Placeholder 3"/>
-          <p:cNvSpPr>
-            <a:spLocks noGrp="1"/>
-          </p:cNvSpPr>
-          <p:nvPr>
-            <p:ph type="sldNum" sz="quarter" idx="5"/>
-          </p:nvPr>
-        </p:nvSpPr>
-        <p:spPr/>
-        <p:txBody>
-          <a:bodyPr/>
-          <a:lstStyle/>
-          <a:p>
-            <a:fld id="{D61C8689-8455-3546-ADF9-3B7273760F66}" type="slidenum">
-              <a:rPr lang="en-US" smtClean="0">
-                <a:effectLst/>
-              </a:rPr>
-              <a:t>5</a:t>
-            </a:fld>
-            <a:endParaRPr lang="en-US">
-              <a:effectLst/>
-            </a:endParaRPr>
-          </a:p>
-        </p:txBody>
-      </p:sp>
-    </p:spTree>
-    <p:extLst>
-      <p:ext uri="{BB962C8B-B14F-4D97-AF65-F5344CB8AC3E}">
-        <p14:creationId xmlns:p14="http://schemas.microsoft.com/office/powerpoint/2010/main" val="884518455"/>
-      </p:ext>
-    </p:extLst>
-  </p:cSld>
-  <p:clrMapOvr>
-    <a:masterClrMapping/>
-  </p:clrMapOvr>
-</p:notes>
-</file>
-
-<file path=ppt/notesSlides/notesSlide30.xml><?xml version="1.0" encoding="utf-8"?>
+<file path=ppt/notesSlides/notesSlide31.xml><?xml version="1.0" encoding="utf-8"?>
 <p:notes xmlns:a="http://schemas.openxmlformats.org/drawingml/2006/main" xmlns:r="http://schemas.openxmlformats.org/officeDocument/2006/relationships" xmlns:p="http://schemas.openxmlformats.org/presentationml/2006/main" showMasterSp="0" showMasterPhAnim="0">
   <p:cSld>
     <p:spTree>
@@ -4049,108 +4107,6 @@
 </p:notes>
 </file>
 
-<file path=ppt/notesSlides/notesSlide31.xml><?xml version="1.0" encoding="utf-8"?>
-<p:notes xmlns:a="http://schemas.openxmlformats.org/drawingml/2006/main" xmlns:r="http://schemas.openxmlformats.org/officeDocument/2006/relationships" xmlns:p="http://schemas.openxmlformats.org/presentationml/2006/main">
-  <p:cSld>
-    <p:spTree>
-      <p:nvGrpSpPr>
-        <p:cNvPr id="1" name=""/>
-        <p:cNvGrpSpPr/>
-        <p:nvPr/>
-      </p:nvGrpSpPr>
-      <p:grpSpPr>
-        <a:xfrm>
-          <a:off x="0" y="0"/>
-          <a:ext cx="0" cy="0"/>
-          <a:chOff x="0" y="0"/>
-          <a:chExt cx="0" cy="0"/>
-        </a:xfrm>
-      </p:grpSpPr>
-      <p:sp>
-        <p:nvSpPr>
-          <p:cNvPr id="2" name="Slide Image Placeholder 1"/>
-          <p:cNvSpPr>
-            <a:spLocks noGrp="1" noRot="1" noChangeAspect="1"/>
-          </p:cNvSpPr>
-          <p:nvPr>
-            <p:ph type="sldImg"/>
-          </p:nvPr>
-        </p:nvSpPr>
-        <p:spPr/>
-      </p:sp>
-      <p:sp>
-        <p:nvSpPr>
-          <p:cNvPr id="3" name="Notes Placeholder 2"/>
-          <p:cNvSpPr>
-            <a:spLocks noGrp="1"/>
-          </p:cNvSpPr>
-          <p:nvPr>
-            <p:ph type="body" idx="1"/>
-          </p:nvPr>
-        </p:nvSpPr>
-        <p:spPr/>
-        <p:txBody>
-          <a:bodyPr/>
-          <a:lstStyle/>
-          <a:p>
-            <a:pPr lvl="0">
-              <a:spcBef>
-                <a:spcPts val="0"/>
-              </a:spcBef>
-              <a:buNone/>
-            </a:pPr>
-            <a:r>
-              <a:rPr lang="en-US" dirty="0"/>
-              <a:t>Another thing you can do if you’re just not sure about</a:t>
-            </a:r>
-            <a:r>
-              <a:rPr lang="en-US" baseline="0" dirty="0"/>
-              <a:t> a project is to take a look at the test suite.</a:t>
-            </a:r>
-            <a:endParaRPr lang="en-US" dirty="0"/>
-          </a:p>
-        </p:txBody>
-      </p:sp>
-      <p:sp>
-        <p:nvSpPr>
-          <p:cNvPr id="4" name="Slide Number Placeholder 3"/>
-          <p:cNvSpPr>
-            <a:spLocks noGrp="1"/>
-          </p:cNvSpPr>
-          <p:nvPr>
-            <p:ph type="sldNum" sz="quarter" idx="5"/>
-          </p:nvPr>
-        </p:nvSpPr>
-        <p:spPr/>
-        <p:txBody>
-          <a:bodyPr/>
-          <a:lstStyle/>
-          <a:p>
-            <a:fld id="{D61C8689-8455-3546-ADF9-3B7273760F66}" type="slidenum">
-              <a:rPr lang="en-US" smtClean="0">
-                <a:effectLst/>
-              </a:rPr>
-              <a:t>33</a:t>
-            </a:fld>
-            <a:endParaRPr lang="en-US">
-              <a:effectLst/>
-            </a:endParaRPr>
-          </a:p>
-        </p:txBody>
-      </p:sp>
-    </p:spTree>
-    <p:extLst>
-      <p:ext uri="{BB962C8B-B14F-4D97-AF65-F5344CB8AC3E}">
-        <p14:creationId xmlns:p14="http://schemas.microsoft.com/office/powerpoint/2010/main" val="2723766377"/>
-      </p:ext>
-    </p:extLst>
-  </p:cSld>
-  <p:clrMapOvr>
-    <a:masterClrMapping/>
-  </p:clrMapOvr>
-</p:notes>
-</file>
-
 <file path=ppt/notesSlides/notesSlide32.xml><?xml version="1.0" encoding="utf-8"?>
 <p:notes xmlns:a="http://schemas.openxmlformats.org/drawingml/2006/main" xmlns:r="http://schemas.openxmlformats.org/officeDocument/2006/relationships" xmlns:p="http://schemas.openxmlformats.org/presentationml/2006/main" showMasterSp="0" showMasterPhAnim="0">
   <p:cSld>
@@ -4290,7 +4246,7 @@
             </a:pPr>
             <a:fld id="{00000000-1234-1234-1234-123412341234}" type="slidenum">
               <a:rPr lang="en-US"/>
-              <a:t>34</a:t>
+              <a:t>33</a:t>
             </a:fld>
             <a:endParaRPr lang="en-US"/>
           </a:p>
@@ -4392,7 +4348,7 @@
               <a:rPr lang="en-US" smtClean="0">
                 <a:effectLst/>
               </a:rPr>
-              <a:t>35</a:t>
+              <a:t>34</a:t>
             </a:fld>
             <a:endParaRPr lang="en-US">
               <a:effectLst/>
@@ -4487,7 +4443,7 @@
             <a:fld id="{D61C8689-8455-3546-ADF9-3B7273760F66}" type="slidenum">
               <a:rPr lang="en-US" smtClean="0"/>
               <a:pPr/>
-              <a:t>36</a:t>
+              <a:t>35</a:t>
             </a:fld>
             <a:endParaRPr lang="en-US" dirty="0"/>
           </a:p>
@@ -4550,52 +4506,137 @@
           <a:bodyPr/>
           <a:lstStyle/>
           <a:p>
-            <a:pPr marL="0" marR="0" lvl="0" indent="0" algn="l" defTabSz="457200" rtl="0" eaLnBrk="1" fontAlgn="auto" latinLnBrk="0" hangingPunct="1">
-              <a:lnSpc>
-                <a:spcPct val="100000"/>
-              </a:lnSpc>
+            <a:pPr lvl="0" rtl="0">
               <a:spcBef>
                 <a:spcPts val="0"/>
               </a:spcBef>
-              <a:spcAft>
+              <a:buNone/>
+            </a:pPr>
+            <a:r>
+              <a:rPr lang="en-US" dirty="0"/>
+              <a:t>Engineers</a:t>
+            </a:r>
+            <a:r>
+              <a:rPr lang="en-US" baseline="0" dirty="0"/>
+              <a:t> aren’t choosing bad packages because they’re malicious or stupid, they’re choosing them because they’ve got other metrics in mind:</a:t>
+            </a:r>
+            <a:endParaRPr lang="en-US" dirty="0"/>
+          </a:p>
+          <a:p>
+            <a:pPr marL="457200" lvl="0" indent="-228600" rtl="0">
+              <a:spcBef>
                 <a:spcPts val="0"/>
-              </a:spcAft>
-              <a:buClrTx/>
-              <a:buSzTx/>
-              <a:buFontTx/>
-              <a:buNone/>
-              <a:tabLst/>
-              <a:defRPr/>
+              </a:spcBef>
+              <a:buClr>
+                <a:schemeClr val="dk2"/>
+              </a:buClr>
+              <a:buChar char="●"/>
             </a:pPr>
             <a:r>
+              <a:rPr lang="en-US" dirty="0">
+                <a:solidFill>
+                  <a:schemeClr val="dk2"/>
+                </a:solidFill>
+              </a:rPr>
+              <a:t>Does it meet our needs now and will it do so in the future?</a:t>
+            </a:r>
+          </a:p>
+          <a:p>
+            <a:pPr marL="457200" lvl="0" indent="-228600" rtl="0">
+              <a:spcBef>
+                <a:spcPts val="0"/>
+              </a:spcBef>
+              <a:buClr>
+                <a:schemeClr val="dk2"/>
+              </a:buClr>
+              <a:buChar char="●"/>
+            </a:pPr>
+            <a:r>
+              <a:rPr lang="en-US" dirty="0">
+                <a:solidFill>
+                  <a:schemeClr val="dk2"/>
+                </a:solidFill>
+              </a:rPr>
+              <a:t>Does it meet our licensing requirements?</a:t>
+            </a:r>
+          </a:p>
+          <a:p>
+            <a:pPr marL="457200" lvl="0" indent="-228600" rtl="0">
+              <a:spcBef>
+                <a:spcPts val="0"/>
+              </a:spcBef>
+              <a:buClr>
+                <a:schemeClr val="dk2"/>
+              </a:buClr>
+              <a:buChar char="●"/>
+            </a:pPr>
+            <a:r>
+              <a:rPr lang="en-US" dirty="0">
+                <a:solidFill>
+                  <a:schemeClr val="dk2"/>
+                </a:solidFill>
+              </a:rPr>
+              <a:t>It is small enough for our</a:t>
+            </a:r>
+            <a:r>
               <a:rPr lang="en-US" baseline="0" dirty="0">
                 <a:solidFill>
                   <a:schemeClr val="dk2"/>
                 </a:solidFill>
               </a:rPr>
-              <a:t>Security can sometimes fall pretty far down that list, and often developers don’t think of themselves as being capable of making security decisions.  But whether you’re trained on making security decisions or not, you </a:t>
-            </a:r>
-            <a:r>
-              <a:rPr lang="en-US" i="1" baseline="0" dirty="0">
+              <a:t> desired footprint?</a:t>
+            </a:r>
+          </a:p>
+          <a:p>
+            <a:pPr marL="457200" lvl="0" indent="-228600" rtl="0">
+              <a:spcBef>
+                <a:spcPts val="0"/>
+              </a:spcBef>
+              <a:buClr>
+                <a:schemeClr val="dk2"/>
+              </a:buClr>
+              <a:buChar char="●"/>
+            </a:pPr>
+            <a:r>
+              <a:rPr lang="en-US" baseline="0" dirty="0">
                 <a:solidFill>
                   <a:schemeClr val="dk2"/>
                 </a:solidFill>
               </a:rPr>
-              <a:t>are</a:t>
-            </a:r>
-            <a:r>
-              <a:rPr lang="en-US" i="0" baseline="0" dirty="0">
-                <a:solidFill>
-                  <a:schemeClr val="dk2"/>
-                </a:solidFill>
-              </a:rPr>
-              <a:t> making security decisions when you choose packages to use.  And statistically speaking, we’re not making great decisions.</a:t>
+              <a:t>Is it what others in the industry are using?</a:t>
             </a:r>
             <a:endParaRPr lang="en-US" dirty="0">
               <a:solidFill>
-                <a:schemeClr val="accent2"/>
+                <a:schemeClr val="dk2"/>
               </a:solidFill>
             </a:endParaRPr>
+          </a:p>
+          <a:p>
+            <a:pPr marL="457200" lvl="0" indent="-228600" rtl="0">
+              <a:spcBef>
+                <a:spcPts val="0"/>
+              </a:spcBef>
+              <a:buClr>
+                <a:schemeClr val="dk2"/>
+              </a:buClr>
+              <a:buChar char="●"/>
+            </a:pPr>
+            <a:r>
+              <a:rPr lang="en-US" dirty="0">
+                <a:solidFill>
+                  <a:schemeClr val="dk2"/>
+                </a:solidFill>
+              </a:rPr>
+              <a:t>Does</a:t>
+            </a:r>
+            <a:r>
+              <a:rPr lang="en-US" baseline="0" dirty="0">
+                <a:solidFill>
+                  <a:schemeClr val="dk2"/>
+                </a:solidFill>
+              </a:rPr>
+              <a:t> it have a good tutorial so we can get someone ramped up to integrate it quickly?</a:t>
+            </a:r>
           </a:p>
           <a:p>
             <a:endParaRPr lang="en-US" dirty="0"/>
@@ -4621,7 +4662,7 @@
               <a:rPr lang="en-US" smtClean="0">
                 <a:effectLst/>
               </a:rPr>
-              <a:t>6</a:t>
+              <a:t>5</a:t>
             </a:fld>
             <a:endParaRPr lang="en-US">
               <a:effectLst/>
@@ -4632,7 +4673,7 @@
     </p:spTree>
     <p:extLst>
       <p:ext uri="{BB962C8B-B14F-4D97-AF65-F5344CB8AC3E}">
-        <p14:creationId xmlns:p14="http://schemas.microsoft.com/office/powerpoint/2010/main" val="3373365708"/>
+        <p14:creationId xmlns:p14="http://schemas.microsoft.com/office/powerpoint/2010/main" val="884518455"/>
       </p:ext>
     </p:extLst>
   </p:cSld>
@@ -4709,7 +4750,23 @@
                   <a:schemeClr val="dk2"/>
                 </a:solidFill>
               </a:rPr>
-              <a:t>For a lot of people, what you care about most is making your shipping deadlines, and our security process is another set of hoops you have to jump through.  Combining poorly vetted packages with that huge backlog is going to hurt your time to market a lot, and we’re already getting a lot of very upset feedback from people who are in that situation.  What we want to do is make sure you’re making good choices early, so you can be more confident of getting a good result when you get package feedback from the reviewers.</a:t>
+              <a:t>Security can sometimes fall pretty far down that list, and often developers don’t think of themselves as being capable of making security decisions.  But whether you’re trained on making security decisions or not, you </a:t>
+            </a:r>
+            <a:r>
+              <a:rPr lang="en-US" i="1" baseline="0" dirty="0">
+                <a:solidFill>
+                  <a:schemeClr val="dk2"/>
+                </a:solidFill>
+              </a:rPr>
+              <a:t>are</a:t>
+            </a:r>
+            <a:r>
+              <a:rPr lang="en-US" i="0" baseline="0" dirty="0">
+                <a:solidFill>
+                  <a:schemeClr val="dk2"/>
+                </a:solidFill>
+              </a:rPr>
+              <a:t> making security decisions when you choose packages to use.  And statistically speaking, we’re not making great decisions.</a:t>
             </a:r>
             <a:endParaRPr lang="en-US" dirty="0">
               <a:solidFill>
@@ -4741,7 +4798,7 @@
               <a:rPr lang="en-US" smtClean="0">
                 <a:effectLst/>
               </a:rPr>
-              <a:t>7</a:t>
+              <a:t>6</a:t>
             </a:fld>
             <a:endParaRPr lang="en-US">
               <a:effectLst/>
@@ -4752,7 +4809,7 @@
     </p:spTree>
     <p:extLst>
       <p:ext uri="{BB962C8B-B14F-4D97-AF65-F5344CB8AC3E}">
-        <p14:creationId xmlns:p14="http://schemas.microsoft.com/office/powerpoint/2010/main" val="4034019391"/>
+        <p14:creationId xmlns:p14="http://schemas.microsoft.com/office/powerpoint/2010/main" val="3373365708"/>
       </p:ext>
     </p:extLst>
   </p:cSld>
@@ -4806,22 +4863,38 @@
           <a:bodyPr/>
           <a:lstStyle/>
           <a:p>
-            <a:r>
-              <a:rPr lang="en-US" baseline="0" dirty="0"/>
-              <a:t>This step is to too often overlooked. Many developers today code by google. While this is not necessarily bad. It can cause problems. Choosing a forked repository not the original OSS repo, choosing a closed and archived repository (</a:t>
-            </a:r>
-            <a:r>
-              <a:rPr lang="en-US" baseline="0" dirty="0" err="1"/>
-              <a:t>code.google.com</a:t>
-            </a:r>
-            <a:r>
-              <a:rPr lang="en-US" baseline="0" dirty="0"/>
-              <a:t>). If you fail at choosing the correct repo all of the rest of your work will </a:t>
-            </a:r>
-            <a:r>
-              <a:rPr lang="en-US" baseline="0"/>
-              <a:t>be pointless.</a:t>
-            </a:r>
+            <a:pPr marL="0" marR="0" lvl="0" indent="0" algn="l" defTabSz="457200" rtl="0" eaLnBrk="1" fontAlgn="auto" latinLnBrk="0" hangingPunct="1">
+              <a:lnSpc>
+                <a:spcPct val="100000"/>
+              </a:lnSpc>
+              <a:spcBef>
+                <a:spcPts val="0"/>
+              </a:spcBef>
+              <a:spcAft>
+                <a:spcPts val="0"/>
+              </a:spcAft>
+              <a:buClrTx/>
+              <a:buSzTx/>
+              <a:buFontTx/>
+              <a:buNone/>
+              <a:tabLst/>
+              <a:defRPr/>
+            </a:pPr>
+            <a:r>
+              <a:rPr lang="en-US" baseline="0" dirty="0">
+                <a:solidFill>
+                  <a:schemeClr val="dk2"/>
+                </a:solidFill>
+              </a:rPr>
+              <a:t>For a lot of people, what you care about most is making your shipping deadlines, and our security process is another set of hoops you have to jump through.  Combining poorly vetted packages with that huge backlog is going to hurt your time to market a lot, and we’re already getting a lot of very upset feedback from people who are in that situation.  What we want to do is make sure you’re making good choices early, so you can be more confident of getting a good result when you get package feedback from the reviewers.</a:t>
+            </a:r>
+            <a:endParaRPr lang="en-US" dirty="0">
+              <a:solidFill>
+                <a:schemeClr val="accent2"/>
+              </a:solidFill>
+            </a:endParaRPr>
+          </a:p>
+          <a:p>
             <a:endParaRPr lang="en-US" dirty="0"/>
           </a:p>
         </p:txBody>
@@ -4845,7 +4918,7 @@
               <a:rPr lang="en-US" smtClean="0">
                 <a:effectLst/>
               </a:rPr>
-              <a:t>8</a:t>
+              <a:t>7</a:t>
             </a:fld>
             <a:endParaRPr lang="en-US">
               <a:effectLst/>
@@ -4856,7 +4929,7 @@
     </p:spTree>
     <p:extLst>
       <p:ext uri="{BB962C8B-B14F-4D97-AF65-F5344CB8AC3E}">
-        <p14:creationId xmlns:p14="http://schemas.microsoft.com/office/powerpoint/2010/main" val="1727833287"/>
+        <p14:creationId xmlns:p14="http://schemas.microsoft.com/office/powerpoint/2010/main" val="4034019391"/>
       </p:ext>
     </p:extLst>
   </p:cSld>
@@ -4912,7 +4985,15 @@
           <a:p>
             <a:r>
               <a:rPr lang="en-US" baseline="0" dirty="0"/>
-              <a:t>The first step is to quickly peruse the public info about the package to see if it passes a basic sniff test.</a:t>
+              <a:t>This step is to too often overlooked. Many developers today code by google. While this is not necessarily bad. It can cause problems. Choosing a forked repository not the original OSS repo, choosing a closed and archived repository (</a:t>
+            </a:r>
+            <a:r>
+              <a:rPr lang="en-US" baseline="0" dirty="0" err="1"/>
+              <a:t>code.google.com</a:t>
+            </a:r>
+            <a:r>
+              <a:rPr lang="en-US" baseline="0" dirty="0"/>
+              <a:t>). If you fail at choosing the correct repo all of the rest of your work will be pointless.</a:t>
             </a:r>
             <a:endParaRPr lang="en-US" dirty="0"/>
           </a:p>
@@ -4937,7 +5018,7 @@
               <a:rPr lang="en-US" smtClean="0">
                 <a:effectLst/>
               </a:rPr>
-              <a:t>9</a:t>
+              <a:t>8</a:t>
             </a:fld>
             <a:endParaRPr lang="en-US">
               <a:effectLst/>
@@ -4948,7 +5029,7 @@
     </p:spTree>
     <p:extLst>
       <p:ext uri="{BB962C8B-B14F-4D97-AF65-F5344CB8AC3E}">
-        <p14:creationId xmlns:p14="http://schemas.microsoft.com/office/powerpoint/2010/main" val="1842263777"/>
+        <p14:creationId xmlns:p14="http://schemas.microsoft.com/office/powerpoint/2010/main" val="1727833287"/>
       </p:ext>
     </p:extLst>
   </p:cSld>
@@ -5003,34 +5084,8 @@
           <a:lstStyle/>
           <a:p>
             <a:r>
-              <a:rPr lang="en-US" dirty="0"/>
-              <a:t>So here’s a few key questions for you.</a:t>
-            </a:r>
-            <a:r>
               <a:rPr lang="en-US" baseline="0" dirty="0"/>
-              <a:t> &lt;read questions from slide with commentary&gt;</a:t>
-            </a:r>
-          </a:p>
-          <a:p>
-            <a:r>
-              <a:rPr lang="en-US" baseline="0" dirty="0"/>
-              <a:t>Good software development standards: A co-worker was asked to do a security review on code where everything in </a:t>
-            </a:r>
-            <a:r>
-              <a:rPr lang="en-US" baseline="0" dirty="0" err="1"/>
-              <a:t>cvs</a:t>
-            </a:r>
-            <a:r>
-              <a:rPr lang="en-US" baseline="0" dirty="0"/>
-              <a:t> was checked in by root, and most of the </a:t>
-            </a:r>
-            <a:r>
-              <a:rPr lang="en-US" baseline="0" dirty="0" err="1"/>
-              <a:t>checkin</a:t>
-            </a:r>
-            <a:r>
-              <a:rPr lang="en-US" baseline="0" dirty="0"/>
-              <a:t> messages were things like “oops” so we’re mostly talking really blatant stuff here.</a:t>
+              <a:t>The first step is to quickly peruse the public info about the package to see if it passes a basic sniff test.</a:t>
             </a:r>
             <a:endParaRPr lang="en-US" dirty="0"/>
           </a:p>
@@ -5043,7 +5098,7 @@
             <a:spLocks noGrp="1"/>
           </p:cNvSpPr>
           <p:nvPr>
-            <p:ph type="sldNum" sz="quarter" idx="10"/>
+            <p:ph type="sldNum" sz="quarter" idx="5"/>
           </p:nvPr>
         </p:nvSpPr>
         <p:spPr/>
@@ -5052,18 +5107,21 @@
           <a:lstStyle/>
           <a:p>
             <a:fld id="{D61C8689-8455-3546-ADF9-3B7273760F66}" type="slidenum">
-              <a:rPr lang="en-US" smtClean="0"/>
-              <a:pPr/>
-              <a:t>10</a:t>
+              <a:rPr lang="en-US" smtClean="0">
+                <a:effectLst/>
+              </a:rPr>
+              <a:t>9</a:t>
             </a:fld>
-            <a:endParaRPr lang="en-US" dirty="0"/>
+            <a:endParaRPr lang="en-US">
+              <a:effectLst/>
+            </a:endParaRPr>
           </a:p>
         </p:txBody>
       </p:sp>
     </p:spTree>
     <p:extLst>
       <p:ext uri="{BB962C8B-B14F-4D97-AF65-F5344CB8AC3E}">
-        <p14:creationId xmlns:p14="http://schemas.microsoft.com/office/powerpoint/2010/main" val="1462555765"/>
+        <p14:creationId xmlns:p14="http://schemas.microsoft.com/office/powerpoint/2010/main" val="1842263777"/>
       </p:ext>
     </p:extLst>
   </p:cSld>
@@ -5117,85 +5175,37 @@
           <a:bodyPr/>
           <a:lstStyle/>
           <a:p>
-            <a:pPr marL="0" marR="0" lvl="0" indent="0" algn="l" defTabSz="457200" rtl="0" eaLnBrk="1" fontAlgn="auto" latinLnBrk="0" hangingPunct="1">
-              <a:lnSpc>
-                <a:spcPct val="100000"/>
-              </a:lnSpc>
-              <a:spcBef>
-                <a:spcPts val="0"/>
-              </a:spcBef>
-              <a:spcAft>
-                <a:spcPts val="0"/>
-              </a:spcAft>
-              <a:buClrTx/>
-              <a:buSzTx/>
-              <a:buFontTx/>
-              <a:buNone/>
-              <a:tabLst/>
-              <a:defRPr/>
-            </a:pPr>
-            <a:r>
-              <a:rPr lang="en-US" dirty="0">
-                <a:solidFill>
-                  <a:schemeClr val="accent2"/>
-                </a:solidFill>
-                <a:latin typeface="Muli"/>
-                <a:ea typeface="Muli"/>
-                <a:cs typeface="Muli"/>
-                <a:sym typeface="Muli"/>
-              </a:rPr>
-              <a:t>Sources: https://github.com/andi506/crypto-js</a:t>
-            </a:r>
-            <a:endParaRPr lang="en" dirty="0">
-              <a:solidFill>
-                <a:schemeClr val="bg2"/>
-              </a:solidFill>
-              <a:latin typeface="Muli"/>
-              <a:ea typeface="Muli"/>
-              <a:cs typeface="Muli"/>
-              <a:sym typeface="Muli"/>
-            </a:endParaRPr>
-          </a:p>
-          <a:p>
-            <a:pPr marL="0" marR="0" indent="0" algn="l" defTabSz="457200" rtl="0" eaLnBrk="1" fontAlgn="auto" latinLnBrk="0" hangingPunct="1">
-              <a:lnSpc>
-                <a:spcPct val="100000"/>
-              </a:lnSpc>
-              <a:spcBef>
-                <a:spcPts val="0"/>
-              </a:spcBef>
-              <a:spcAft>
-                <a:spcPts val="0"/>
-              </a:spcAft>
-              <a:buClrTx/>
-              <a:buSzTx/>
-              <a:buFontTx/>
-              <a:buNone/>
-              <a:tabLst/>
-              <a:defRPr/>
-            </a:pPr>
-            <a:r>
-              <a:rPr lang="en" dirty="0">
-                <a:solidFill>
-                  <a:schemeClr val="bg2"/>
-                </a:solidFill>
-                <a:latin typeface="Muli"/>
-                <a:ea typeface="Muli"/>
-                <a:cs typeface="Muli"/>
-                <a:sym typeface="Muli"/>
-              </a:rPr>
-              <a:t>https://github.com/01org/IntelRackScaleArchitecture</a:t>
-            </a:r>
-          </a:p>
-          <a:p>
             <a:r>
               <a:rPr lang="en-US" dirty="0"/>
-              <a:t>The first one here is a crypto package</a:t>
+              <a:t>So here’s a few key questions for you.</a:t>
             </a:r>
             <a:r>
               <a:rPr lang="en-US" baseline="0" dirty="0"/>
-              <a:t> that quietly says [read end of quote] which basically translates to “this is sometimes really slow and also probably insecure, don’t use it” and the second one is much more explicit “this doesn’t meet our quality standards for commercial products, don’t use it”</a:t>
-            </a:r>
+              <a:t> &lt;read questions from slide with commentary&gt;</a:t>
+            </a:r>
+          </a:p>
+          <a:p>
+            <a:r>
+              <a:rPr lang="en-US" baseline="0" dirty="0"/>
+              <a:t>Good software development standards: A co-worker was asked to do a security review on code where everything in </a:t>
+            </a:r>
+            <a:r>
+              <a:rPr lang="en-US" baseline="0" dirty="0" err="1"/>
+              <a:t>cvs</a:t>
+            </a:r>
+            <a:r>
+              <a:rPr lang="en-US" baseline="0" dirty="0"/>
+              <a:t> was checked in by root, and most of the </a:t>
+            </a:r>
+            <a:r>
+              <a:rPr lang="en-US" baseline="0" dirty="0" err="1"/>
+              <a:t>checkin</a:t>
+            </a:r>
+            <a:r>
+              <a:rPr lang="en-US" baseline="0" dirty="0"/>
+              <a:t> messages were things like “oops” so we’re mostly talking really blatant stuff here.</a:t>
+            </a:r>
+            <a:endParaRPr lang="en-US" dirty="0"/>
           </a:p>
         </p:txBody>
       </p:sp>
@@ -5217,7 +5227,7 @@
             <a:fld id="{D61C8689-8455-3546-ADF9-3B7273760F66}" type="slidenum">
               <a:rPr lang="en-US" smtClean="0"/>
               <a:pPr/>
-              <a:t>11</a:t>
+              <a:t>10</a:t>
             </a:fld>
             <a:endParaRPr lang="en-US" dirty="0"/>
           </a:p>
@@ -5226,7 +5236,7 @@
     </p:spTree>
     <p:extLst>
       <p:ext uri="{BB962C8B-B14F-4D97-AF65-F5344CB8AC3E}">
-        <p14:creationId xmlns:p14="http://schemas.microsoft.com/office/powerpoint/2010/main" val="1564770546"/>
+        <p14:creationId xmlns:p14="http://schemas.microsoft.com/office/powerpoint/2010/main" val="1462555765"/>
       </p:ext>
     </p:extLst>
   </p:cSld>
@@ -5475,7 +5485,7 @@
           <a:noFill/>
           <a:extLst>
             <a:ext uri="{909E8E84-426E-40dd-AFC4-6F175D3DCCD1}">
-              <a14:hiddenFill xmlns="" xmlns:a14="http://schemas.microsoft.com/office/drawing/2010/main">
+              <a14:hiddenFill xmlns:a14="http://schemas.microsoft.com/office/drawing/2010/main" xmlns="">
                 <a:solidFill>
                   <a:srgbClr val="FFFFFF"/>
                 </a:solidFill>
@@ -6459,7 +6469,7 @@
           <a:noFill/>
           <a:extLst>
             <a:ext uri="{909E8E84-426E-40dd-AFC4-6F175D3DCCD1}">
-              <a14:hiddenFill xmlns:a14="http://schemas.microsoft.com/office/drawing/2010/main" xmlns="">
+              <a14:hiddenFill xmlns="" xmlns:a14="http://schemas.microsoft.com/office/drawing/2010/main">
                 <a:solidFill>
                   <a:srgbClr val="FFFFFF"/>
                 </a:solidFill>
@@ -11308,6 +11318,41 @@
           </a:prstGeom>
         </p:spPr>
       </p:pic>
+      <p:sp>
+        <p:nvSpPr>
+          <p:cNvPr id="5" name="TextBox 4">
+            <a:extLst>
+              <a:ext uri="{FF2B5EF4-FFF2-40B4-BE49-F238E27FC236}">
+                <a16:creationId xmlns:a16="http://schemas.microsoft.com/office/drawing/2014/main" id="{B5E196A2-ECC1-0C46-92AB-E4082BFB9919}"/>
+              </a:ext>
+            </a:extLst>
+          </p:cNvPr>
+          <p:cNvSpPr txBox="1"/>
+          <p:nvPr/>
+        </p:nvSpPr>
+        <p:spPr>
+          <a:xfrm>
+            <a:off x="455613" y="4548358"/>
+            <a:ext cx="3359894" cy="161583"/>
+          </a:xfrm>
+          <a:prstGeom prst="rect">
+            <a:avLst/>
+          </a:prstGeom>
+          <a:noFill/>
+        </p:spPr>
+        <p:txBody>
+          <a:bodyPr wrap="none" lIns="0" tIns="0" rIns="0" bIns="0" rtlCol="0">
+            <a:spAutoFit/>
+          </a:bodyPr>
+          <a:lstStyle/>
+          <a:p>
+            <a:r>
+              <a:rPr lang="en-US" sz="1050" dirty="0"/>
+              <a:t>2018 Synopsis  Open Source Security and Risk Analysis</a:t>
+            </a:r>
+          </a:p>
+        </p:txBody>
+      </p:sp>
     </p:spTree>
     <p:extLst>
       <p:ext uri="{BB962C8B-B14F-4D97-AF65-F5344CB8AC3E}">
@@ -11997,98 +12042,6 @@
   <p:cSld>
     <p:spTree>
       <p:nvGrpSpPr>
-        <p:cNvPr id="1" name=""/>
-        <p:cNvGrpSpPr/>
-        <p:nvPr/>
-      </p:nvGrpSpPr>
-      <p:grpSpPr>
-        <a:xfrm>
-          <a:off x="0" y="0"/>
-          <a:ext cx="0" cy="0"/>
-          <a:chOff x="0" y="0"/>
-          <a:chExt cx="0" cy="0"/>
-        </a:xfrm>
-      </p:grpSpPr>
-      <p:sp>
-        <p:nvSpPr>
-          <p:cNvPr id="2" name="Title 1"/>
-          <p:cNvSpPr>
-            <a:spLocks noGrp="1"/>
-          </p:cNvSpPr>
-          <p:nvPr>
-            <p:ph type="ctrTitle"/>
-          </p:nvPr>
-        </p:nvSpPr>
-        <p:spPr>
-          <a:xfrm>
-            <a:off x="444687" y="2219631"/>
-            <a:ext cx="8212886" cy="1102519"/>
-          </a:xfrm>
-        </p:spPr>
-        <p:txBody>
-          <a:bodyPr/>
-          <a:lstStyle/>
-          <a:p>
-            <a:pPr algn="ctr"/>
-            <a:r>
-              <a:rPr lang="en-US" dirty="0">
-                <a:solidFill>
-                  <a:schemeClr val="accent3"/>
-                </a:solidFill>
-              </a:rPr>
-              <a:t>Step 4: Look at </a:t>
-            </a:r>
-            <a:br>
-              <a:rPr lang="en-US" dirty="0">
-                <a:solidFill>
-                  <a:schemeClr val="accent3"/>
-                </a:solidFill>
-              </a:rPr>
-            </a:br>
-            <a:r>
-              <a:rPr lang="en-US" dirty="0">
-                <a:solidFill>
-                  <a:schemeClr val="accent3"/>
-                </a:solidFill>
-              </a:rPr>
-              <a:t>the test </a:t>
-            </a:r>
-            <a:br>
-              <a:rPr lang="en-US" dirty="0">
-                <a:solidFill>
-                  <a:schemeClr val="accent3"/>
-                </a:solidFill>
-              </a:rPr>
-            </a:br>
-            <a:r>
-              <a:rPr lang="en-US" dirty="0">
-                <a:solidFill>
-                  <a:schemeClr val="accent3"/>
-                </a:solidFill>
-              </a:rPr>
-              <a:t>suite</a:t>
-            </a:r>
-          </a:p>
-        </p:txBody>
-      </p:sp>
-    </p:spTree>
-    <p:extLst>
-      <p:ext uri="{BB962C8B-B14F-4D97-AF65-F5344CB8AC3E}">
-        <p14:creationId xmlns:p14="http://schemas.microsoft.com/office/powerpoint/2010/main" val="2304014821"/>
-      </p:ext>
-    </p:extLst>
-  </p:cSld>
-  <p:clrMapOvr>
-    <a:masterClrMapping/>
-  </p:clrMapOvr>
-</p:sld>
-</file>
-
-<file path=ppt/slides/slide34.xml><?xml version="1.0" encoding="utf-8"?>
-<p:sld xmlns:a="http://schemas.openxmlformats.org/drawingml/2006/main" xmlns:r="http://schemas.openxmlformats.org/officeDocument/2006/relationships" xmlns:p="http://schemas.openxmlformats.org/presentationml/2006/main">
-  <p:cSld>
-    <p:spTree>
-      <p:nvGrpSpPr>
         <p:cNvPr id="1" name="Shape 349"/>
         <p:cNvGrpSpPr/>
         <p:nvPr/>
@@ -12139,7 +12092,7 @@
             </a:pPr>
             <a:fld id="{00000000-1234-1234-1234-123412341234}" type="slidenum">
               <a:rPr lang="en-US"/>
-              <a:t>34</a:t>
+              <a:t>33</a:t>
             </a:fld>
             <a:endParaRPr lang="en-US"/>
           </a:p>
@@ -12302,6 +12255,83 @@
 </p:sld>
 </file>
 
+<file path=ppt/slides/slide34.xml><?xml version="1.0" encoding="utf-8"?>
+<p:sld xmlns:a="http://schemas.openxmlformats.org/drawingml/2006/main" xmlns:r="http://schemas.openxmlformats.org/officeDocument/2006/relationships" xmlns:p="http://schemas.openxmlformats.org/presentationml/2006/main">
+  <p:cSld>
+    <p:spTree>
+      <p:nvGrpSpPr>
+        <p:cNvPr id="1" name=""/>
+        <p:cNvGrpSpPr/>
+        <p:nvPr/>
+      </p:nvGrpSpPr>
+      <p:grpSpPr>
+        <a:xfrm>
+          <a:off x="0" y="0"/>
+          <a:ext cx="0" cy="0"/>
+          <a:chOff x="0" y="0"/>
+          <a:chExt cx="0" cy="0"/>
+        </a:xfrm>
+      </p:grpSpPr>
+      <p:sp>
+        <p:nvSpPr>
+          <p:cNvPr id="2" name="Title 1"/>
+          <p:cNvSpPr>
+            <a:spLocks noGrp="1"/>
+          </p:cNvSpPr>
+          <p:nvPr>
+            <p:ph type="ctrTitle"/>
+          </p:nvPr>
+        </p:nvSpPr>
+        <p:spPr>
+          <a:xfrm>
+            <a:off x="444687" y="2219631"/>
+            <a:ext cx="8212886" cy="1102519"/>
+          </a:xfrm>
+        </p:spPr>
+        <p:txBody>
+          <a:bodyPr/>
+          <a:lstStyle/>
+          <a:p>
+            <a:pPr algn="ctr"/>
+            <a:r>
+              <a:rPr lang="en-US" dirty="0">
+                <a:solidFill>
+                  <a:schemeClr val="accent3"/>
+                </a:solidFill>
+              </a:rPr>
+              <a:t>Bringing it</a:t>
+            </a:r>
+            <a:br>
+              <a:rPr lang="en-US" dirty="0">
+                <a:solidFill>
+                  <a:schemeClr val="accent3"/>
+                </a:solidFill>
+              </a:rPr>
+            </a:br>
+            <a:r>
+              <a:rPr lang="en-US" dirty="0">
+                <a:solidFill>
+                  <a:schemeClr val="accent3"/>
+                </a:solidFill>
+              </a:rPr>
+              <a:t>all together</a:t>
+            </a:r>
+          </a:p>
+        </p:txBody>
+      </p:sp>
+    </p:spTree>
+    <p:extLst>
+      <p:ext uri="{BB962C8B-B14F-4D97-AF65-F5344CB8AC3E}">
+        <p14:creationId xmlns:p14="http://schemas.microsoft.com/office/powerpoint/2010/main" val="3569411851"/>
+      </p:ext>
+    </p:extLst>
+  </p:cSld>
+  <p:clrMapOvr>
+    <a:masterClrMapping/>
+  </p:clrMapOvr>
+</p:sld>
+</file>
+
 <file path=ppt/slides/slide35.xml><?xml version="1.0" encoding="utf-8"?>
 <p:sld xmlns:a="http://schemas.openxmlformats.org/drawingml/2006/main" xmlns:r="http://schemas.openxmlformats.org/officeDocument/2006/relationships" xmlns:p="http://schemas.openxmlformats.org/presentationml/2006/main">
   <p:cSld>
@@ -12321,83 +12351,6 @@
       </p:grpSpPr>
       <p:sp>
         <p:nvSpPr>
-          <p:cNvPr id="2" name="Title 1"/>
-          <p:cNvSpPr>
-            <a:spLocks noGrp="1"/>
-          </p:cNvSpPr>
-          <p:nvPr>
-            <p:ph type="ctrTitle"/>
-          </p:nvPr>
-        </p:nvSpPr>
-        <p:spPr>
-          <a:xfrm>
-            <a:off x="444687" y="2219631"/>
-            <a:ext cx="8212886" cy="1102519"/>
-          </a:xfrm>
-        </p:spPr>
-        <p:txBody>
-          <a:bodyPr/>
-          <a:lstStyle/>
-          <a:p>
-            <a:pPr algn="ctr"/>
-            <a:r>
-              <a:rPr lang="en-US" dirty="0">
-                <a:solidFill>
-                  <a:schemeClr val="accent3"/>
-                </a:solidFill>
-              </a:rPr>
-              <a:t>Bringing it</a:t>
-            </a:r>
-            <a:br>
-              <a:rPr lang="en-US" dirty="0">
-                <a:solidFill>
-                  <a:schemeClr val="accent3"/>
-                </a:solidFill>
-              </a:rPr>
-            </a:br>
-            <a:r>
-              <a:rPr lang="en-US" dirty="0">
-                <a:solidFill>
-                  <a:schemeClr val="accent3"/>
-                </a:solidFill>
-              </a:rPr>
-              <a:t>all together</a:t>
-            </a:r>
-          </a:p>
-        </p:txBody>
-      </p:sp>
-    </p:spTree>
-    <p:extLst>
-      <p:ext uri="{BB962C8B-B14F-4D97-AF65-F5344CB8AC3E}">
-        <p14:creationId xmlns:p14="http://schemas.microsoft.com/office/powerpoint/2010/main" val="3569411851"/>
-      </p:ext>
-    </p:extLst>
-  </p:cSld>
-  <p:clrMapOvr>
-    <a:masterClrMapping/>
-  </p:clrMapOvr>
-</p:sld>
-</file>
-
-<file path=ppt/slides/slide36.xml><?xml version="1.0" encoding="utf-8"?>
-<p:sld xmlns:a="http://schemas.openxmlformats.org/drawingml/2006/main" xmlns:r="http://schemas.openxmlformats.org/officeDocument/2006/relationships" xmlns:p="http://schemas.openxmlformats.org/presentationml/2006/main">
-  <p:cSld>
-    <p:spTree>
-      <p:nvGrpSpPr>
-        <p:cNvPr id="1" name=""/>
-        <p:cNvGrpSpPr/>
-        <p:nvPr/>
-      </p:nvGrpSpPr>
-      <p:grpSpPr>
-        <a:xfrm>
-          <a:off x="0" y="0"/>
-          <a:ext cx="0" cy="0"/>
-          <a:chOff x="0" y="0"/>
-          <a:chExt cx="0" cy="0"/>
-        </a:xfrm>
-      </p:grpSpPr>
-      <p:sp>
-        <p:nvSpPr>
           <p:cNvPr id="2" name="Slide Number Placeholder 1"/>
           <p:cNvSpPr>
             <a:spLocks noGrp="1"/>
@@ -12414,7 +12367,7 @@
             <a:fld id="{EE2556C5-CE8C-6547-B838-EA80C61A4AF7}" type="slidenum">
               <a:rPr lang="en-US" smtClean="0"/>
               <a:pPr/>
-              <a:t>36</a:t>
+              <a:t>35</a:t>
             </a:fld>
             <a:endParaRPr lang="en-US" dirty="0"/>
           </a:p>
@@ -12610,234 +12563,6 @@
 </p:sld>
 </file>
 
-<file path=ppt/slides/slide37.xml><?xml version="1.0" encoding="utf-8"?>
-<p:sld xmlns:a="http://schemas.openxmlformats.org/drawingml/2006/main" xmlns:r="http://schemas.openxmlformats.org/officeDocument/2006/relationships" xmlns:p="http://schemas.openxmlformats.org/presentationml/2006/main">
-  <p:cSld>
-    <p:spTree>
-      <p:nvGrpSpPr>
-        <p:cNvPr id="1" name=""/>
-        <p:cNvGrpSpPr/>
-        <p:nvPr/>
-      </p:nvGrpSpPr>
-      <p:grpSpPr>
-        <a:xfrm>
-          <a:off x="0" y="0"/>
-          <a:ext cx="0" cy="0"/>
-          <a:chOff x="0" y="0"/>
-          <a:chExt cx="0" cy="0"/>
-        </a:xfrm>
-      </p:grpSpPr>
-      <p:sp>
-        <p:nvSpPr>
-          <p:cNvPr id="2" name="Content Placeholder 1"/>
-          <p:cNvSpPr>
-            <a:spLocks noGrp="1"/>
-          </p:cNvSpPr>
-          <p:nvPr>
-            <p:ph sz="quarter" idx="13"/>
-          </p:nvPr>
-        </p:nvSpPr>
-        <p:spPr/>
-        <p:txBody>
-          <a:bodyPr/>
-          <a:lstStyle/>
-          <a:p>
-            <a:endParaRPr lang="en-US"/>
-          </a:p>
-        </p:txBody>
-      </p:sp>
-      <p:sp>
-        <p:nvSpPr>
-          <p:cNvPr id="3" name="Title 2"/>
-          <p:cNvSpPr>
-            <a:spLocks noGrp="1"/>
-          </p:cNvSpPr>
-          <p:nvPr>
-            <p:ph type="title"/>
-          </p:nvPr>
-        </p:nvSpPr>
-        <p:spPr/>
-        <p:txBody>
-          <a:bodyPr/>
-          <a:lstStyle/>
-          <a:p>
-            <a:endParaRPr lang="en-US" dirty="0"/>
-          </a:p>
-        </p:txBody>
-      </p:sp>
-    </p:spTree>
-    <p:extLst>
-      <p:ext uri="{BB962C8B-B14F-4D97-AF65-F5344CB8AC3E}">
-        <p14:creationId xmlns:p14="http://schemas.microsoft.com/office/powerpoint/2010/main" val="3843581129"/>
-      </p:ext>
-    </p:extLst>
-  </p:cSld>
-  <p:clrMapOvr>
-    <a:masterClrMapping/>
-  </p:clrMapOvr>
-  <mc:AlternateContent xmlns:mc="http://schemas.openxmlformats.org/markup-compatibility/2006" xmlns:p14="http://schemas.microsoft.com/office/powerpoint/2010/main">
-    <mc:Choice Requires="p14">
-      <p:transition spd="med" p14:dur="700">
-        <p:fade/>
-      </p:transition>
-    </mc:Choice>
-    <mc:Fallback xmlns="">
-      <p:transition spd="med">
-        <p:fade/>
-      </p:transition>
-    </mc:Fallback>
-  </mc:AlternateContent>
-</p:sld>
-</file>
-
-<file path=ppt/slides/slide38.xml><?xml version="1.0" encoding="utf-8"?>
-<p:sld xmlns:a="http://schemas.openxmlformats.org/drawingml/2006/main" xmlns:r="http://schemas.openxmlformats.org/officeDocument/2006/relationships" xmlns:p="http://schemas.openxmlformats.org/presentationml/2006/main">
-  <p:cSld>
-    <p:spTree>
-      <p:nvGrpSpPr>
-        <p:cNvPr id="1" name=""/>
-        <p:cNvGrpSpPr/>
-        <p:nvPr/>
-      </p:nvGrpSpPr>
-      <p:grpSpPr>
-        <a:xfrm>
-          <a:off x="0" y="0"/>
-          <a:ext cx="0" cy="0"/>
-          <a:chOff x="0" y="0"/>
-          <a:chExt cx="0" cy="0"/>
-        </a:xfrm>
-      </p:grpSpPr>
-      <p:sp>
-        <p:nvSpPr>
-          <p:cNvPr id="2" name="Content Placeholder 1"/>
-          <p:cNvSpPr>
-            <a:spLocks noGrp="1"/>
-          </p:cNvSpPr>
-          <p:nvPr>
-            <p:ph sz="half" idx="1"/>
-          </p:nvPr>
-        </p:nvSpPr>
-        <p:spPr/>
-        <p:txBody>
-          <a:bodyPr/>
-          <a:lstStyle/>
-          <a:p>
-            <a:endParaRPr lang="en-US"/>
-          </a:p>
-        </p:txBody>
-      </p:sp>
-      <p:sp>
-        <p:nvSpPr>
-          <p:cNvPr id="3" name="Content Placeholder 2"/>
-          <p:cNvSpPr>
-            <a:spLocks noGrp="1"/>
-          </p:cNvSpPr>
-          <p:nvPr>
-            <p:ph sz="half" idx="13"/>
-          </p:nvPr>
-        </p:nvSpPr>
-        <p:spPr/>
-        <p:txBody>
-          <a:bodyPr/>
-          <a:lstStyle/>
-          <a:p>
-            <a:endParaRPr lang="en-US"/>
-          </a:p>
-        </p:txBody>
-      </p:sp>
-      <p:sp>
-        <p:nvSpPr>
-          <p:cNvPr id="4" name="Title 3"/>
-          <p:cNvSpPr>
-            <a:spLocks noGrp="1"/>
-          </p:cNvSpPr>
-          <p:nvPr>
-            <p:ph type="title"/>
-          </p:nvPr>
-        </p:nvSpPr>
-        <p:spPr/>
-        <p:txBody>
-          <a:bodyPr/>
-          <a:lstStyle/>
-          <a:p>
-            <a:endParaRPr lang="en-US" dirty="0"/>
-          </a:p>
-        </p:txBody>
-      </p:sp>
-    </p:spTree>
-    <p:extLst>
-      <p:ext uri="{BB962C8B-B14F-4D97-AF65-F5344CB8AC3E}">
-        <p14:creationId xmlns:p14="http://schemas.microsoft.com/office/powerpoint/2010/main" val="2780666071"/>
-      </p:ext>
-    </p:extLst>
-  </p:cSld>
-  <p:clrMapOvr>
-    <a:masterClrMapping/>
-  </p:clrMapOvr>
-  <mc:AlternateContent xmlns:mc="http://schemas.openxmlformats.org/markup-compatibility/2006" xmlns:p14="http://schemas.microsoft.com/office/powerpoint/2010/main">
-    <mc:Choice Requires="p14">
-      <p:transition spd="med" p14:dur="700">
-        <p:fade/>
-      </p:transition>
-    </mc:Choice>
-    <mc:Fallback xmlns="">
-      <p:transition spd="med">
-        <p:fade/>
-      </p:transition>
-    </mc:Fallback>
-  </mc:AlternateContent>
-</p:sld>
-</file>
-
-<file path=ppt/slides/slide39.xml><?xml version="1.0" encoding="utf-8"?>
-<p:sld xmlns:a="http://schemas.openxmlformats.org/drawingml/2006/main" xmlns:r="http://schemas.openxmlformats.org/officeDocument/2006/relationships" xmlns:p="http://schemas.openxmlformats.org/presentationml/2006/main">
-  <p:cSld>
-    <p:spTree>
-      <p:nvGrpSpPr>
-        <p:cNvPr id="1" name=""/>
-        <p:cNvGrpSpPr/>
-        <p:nvPr/>
-      </p:nvGrpSpPr>
-      <p:grpSpPr>
-        <a:xfrm>
-          <a:off x="0" y="0"/>
-          <a:ext cx="0" cy="0"/>
-          <a:chOff x="0" y="0"/>
-          <a:chExt cx="0" cy="0"/>
-        </a:xfrm>
-      </p:grpSpPr>
-      <p:sp>
-        <p:nvSpPr>
-          <p:cNvPr id="2" name="Title 1"/>
-          <p:cNvSpPr>
-            <a:spLocks noGrp="1"/>
-          </p:cNvSpPr>
-          <p:nvPr>
-            <p:ph type="title"/>
-          </p:nvPr>
-        </p:nvSpPr>
-        <p:spPr/>
-        <p:txBody>
-          <a:bodyPr/>
-          <a:lstStyle/>
-          <a:p>
-            <a:endParaRPr lang="en-US"/>
-          </a:p>
-        </p:txBody>
-      </p:sp>
-    </p:spTree>
-    <p:extLst>
-      <p:ext uri="{BB962C8B-B14F-4D97-AF65-F5344CB8AC3E}">
-        <p14:creationId xmlns:p14="http://schemas.microsoft.com/office/powerpoint/2010/main" val="1828800984"/>
-      </p:ext>
-    </p:extLst>
-  </p:cSld>
-  <p:clrMapOvr>
-    <a:masterClrMapping/>
-  </p:clrMapOvr>
-</p:sld>
-</file>
-
 <file path=ppt/slides/slide4.xml><?xml version="1.0" encoding="utf-8"?>
 <p:sld xmlns:a="http://schemas.openxmlformats.org/drawingml/2006/main" xmlns:r="http://schemas.openxmlformats.org/officeDocument/2006/relationships" xmlns:p="http://schemas.openxmlformats.org/presentationml/2006/main">
   <p:cSld>
@@ -12923,123 +12648,6 @@
       </p:transition>
     </mc:Fallback>
   </mc:AlternateContent>
-</p:sld>
-</file>
-
-<file path=ppt/slides/slide40.xml><?xml version="1.0" encoding="utf-8"?>
-<p:sld xmlns:a="http://schemas.openxmlformats.org/drawingml/2006/main" xmlns:r="http://schemas.openxmlformats.org/officeDocument/2006/relationships" xmlns:p="http://schemas.openxmlformats.org/presentationml/2006/main">
-  <p:cSld>
-    <p:spTree>
-      <p:nvGrpSpPr>
-        <p:cNvPr id="1" name=""/>
-        <p:cNvGrpSpPr/>
-        <p:nvPr/>
-      </p:nvGrpSpPr>
-      <p:grpSpPr>
-        <a:xfrm>
-          <a:off x="0" y="0"/>
-          <a:ext cx="0" cy="0"/>
-          <a:chOff x="0" y="0"/>
-          <a:chExt cx="0" cy="0"/>
-        </a:xfrm>
-      </p:grpSpPr>
-    </p:spTree>
-    <p:extLst>
-      <p:ext uri="{BB962C8B-B14F-4D97-AF65-F5344CB8AC3E}">
-        <p14:creationId xmlns:p14="http://schemas.microsoft.com/office/powerpoint/2010/main" val="3082922735"/>
-      </p:ext>
-    </p:extLst>
-  </p:cSld>
-  <p:clrMapOvr>
-    <a:masterClrMapping/>
-  </p:clrMapOvr>
-</p:sld>
-</file>
-
-<file path=ppt/slides/slide41.xml><?xml version="1.0" encoding="utf-8"?>
-<p:sld xmlns:a="http://schemas.openxmlformats.org/drawingml/2006/main" xmlns:r="http://schemas.openxmlformats.org/officeDocument/2006/relationships" xmlns:p="http://schemas.openxmlformats.org/presentationml/2006/main">
-  <p:cSld>
-    <p:spTree>
-      <p:nvGrpSpPr>
-        <p:cNvPr id="1" name=""/>
-        <p:cNvGrpSpPr/>
-        <p:nvPr/>
-      </p:nvGrpSpPr>
-      <p:grpSpPr>
-        <a:xfrm>
-          <a:off x="0" y="0"/>
-          <a:ext cx="0" cy="0"/>
-          <a:chOff x="0" y="0"/>
-          <a:chExt cx="0" cy="0"/>
-        </a:xfrm>
-      </p:grpSpPr>
-      <p:sp>
-        <p:nvSpPr>
-          <p:cNvPr id="2" name="Title 1"/>
-          <p:cNvSpPr>
-            <a:spLocks noGrp="1"/>
-          </p:cNvSpPr>
-          <p:nvPr>
-            <p:ph type="title"/>
-          </p:nvPr>
-        </p:nvSpPr>
-        <p:spPr/>
-        <p:txBody>
-          <a:bodyPr/>
-          <a:lstStyle/>
-          <a:p>
-            <a:endParaRPr lang="en-US"/>
-          </a:p>
-        </p:txBody>
-      </p:sp>
-      <p:sp>
-        <p:nvSpPr>
-          <p:cNvPr id="3" name="Content Placeholder 2"/>
-          <p:cNvSpPr>
-            <a:spLocks noGrp="1"/>
-          </p:cNvSpPr>
-          <p:nvPr>
-            <p:ph idx="1"/>
-          </p:nvPr>
-        </p:nvSpPr>
-        <p:spPr/>
-        <p:txBody>
-          <a:bodyPr/>
-          <a:lstStyle/>
-          <a:p>
-            <a:endParaRPr lang="en-US"/>
-          </a:p>
-        </p:txBody>
-      </p:sp>
-      <p:sp>
-        <p:nvSpPr>
-          <p:cNvPr id="4" name="Text Placeholder 3"/>
-          <p:cNvSpPr>
-            <a:spLocks noGrp="1"/>
-          </p:cNvSpPr>
-          <p:nvPr>
-            <p:ph type="body" sz="half" idx="2"/>
-          </p:nvPr>
-        </p:nvSpPr>
-        <p:spPr/>
-        <p:txBody>
-          <a:bodyPr/>
-          <a:lstStyle/>
-          <a:p>
-            <a:endParaRPr lang="en-US"/>
-          </a:p>
-        </p:txBody>
-      </p:sp>
-    </p:spTree>
-    <p:extLst>
-      <p:ext uri="{BB962C8B-B14F-4D97-AF65-F5344CB8AC3E}">
-        <p14:creationId xmlns:p14="http://schemas.microsoft.com/office/powerpoint/2010/main" val="2438105822"/>
-      </p:ext>
-    </p:extLst>
-  </p:cSld>
-  <p:clrMapOvr>
-    <a:masterClrMapping/>
-  </p:clrMapOvr>
 </p:sld>
 </file>
 
@@ -14358,12 +13966,6 @@
 </file>
 
 <file path=customXml/item1.xml><?xml version="1.0" encoding="utf-8"?>
-<p:properties xmlns:p="http://schemas.microsoft.com/office/2006/metadata/properties" xmlns:xsi="http://www.w3.org/2001/XMLSchema-instance" xmlns:pc="http://schemas.microsoft.com/office/infopath/2007/PartnerControls">
-  <documentManagement/>
-</p:properties>
-</file>
-
-<file path=customXml/item2.xml><?xml version="1.0" encoding="utf-8"?>
 <?mso-contentType ?>
 <FormTemplates xmlns="http://schemas.microsoft.com/sharepoint/v3/contenttype/forms">
   <Display>DocumentLibraryForm</Display>
@@ -14372,7 +13974,7 @@
 </FormTemplates>
 </file>
 
-<file path=customXml/item3.xml><?xml version="1.0" encoding="utf-8"?>
+<file path=customXml/item2.xml><?xml version="1.0" encoding="utf-8"?>
 <ct:contentTypeSchema xmlns:ct="http://schemas.microsoft.com/office/2006/metadata/contentType" xmlns:ma="http://schemas.microsoft.com/office/2006/metadata/properties/metaAttributes" ct:_="" ma:_="" ma:contentTypeName="Document" ma:contentTypeID="0x010100FE3147A616715144915684D7A284166B" ma:contentTypeVersion="" ma:contentTypeDescription="Create a new document." ma:contentTypeScope="" ma:versionID="9596a8e1e16da32e56867dfa34e83b53">
   <xsd:schema xmlns:xsd="http://www.w3.org/2001/XMLSchema" xmlns:xs="http://www.w3.org/2001/XMLSchema" xmlns:p="http://schemas.microsoft.com/office/2006/metadata/properties" targetNamespace="http://schemas.microsoft.com/office/2006/metadata/properties" ma:root="true" ma:fieldsID="b2384c6cc0088fcedbaf6edaf557defa">
     <xsd:element name="properties">
@@ -14486,22 +14088,13 @@
 </ct:contentTypeSchema>
 </file>
 
-<file path=customXml/itemProps1.xml><?xml version="1.0" encoding="utf-8"?>
-<ds:datastoreItem xmlns:ds="http://schemas.openxmlformats.org/officeDocument/2006/customXml" ds:itemID="{EF15BCB2-E926-4FE6-8A3D-B25070C09F42}">
-  <ds:schemaRefs>
-    <ds:schemaRef ds:uri="http://purl.org/dc/terms/"/>
-    <ds:schemaRef ds:uri="http://schemas.openxmlformats.org/package/2006/metadata/core-properties"/>
-    <ds:schemaRef ds:uri="http://schemas.microsoft.com/office/2006/documentManagement/types"/>
-    <ds:schemaRef ds:uri="http://purl.org/dc/elements/1.1/"/>
-    <ds:schemaRef ds:uri="http://schemas.microsoft.com/office/2006/metadata/properties"/>
-    <ds:schemaRef ds:uri="http://schemas.microsoft.com/office/infopath/2007/PartnerControls"/>
-    <ds:schemaRef ds:uri="http://www.w3.org/XML/1998/namespace"/>
-    <ds:schemaRef ds:uri="http://purl.org/dc/dcmitype/"/>
-  </ds:schemaRefs>
-</ds:datastoreItem>
+<file path=customXml/item3.xml><?xml version="1.0" encoding="utf-8"?>
+<p:properties xmlns:p="http://schemas.microsoft.com/office/2006/metadata/properties" xmlns:xsi="http://www.w3.org/2001/XMLSchema-instance" xmlns:pc="http://schemas.microsoft.com/office/infopath/2007/PartnerControls">
+  <documentManagement/>
+</p:properties>
 </file>
 
-<file path=customXml/itemProps2.xml><?xml version="1.0" encoding="utf-8"?>
+<file path=customXml/itemProps1.xml><?xml version="1.0" encoding="utf-8"?>
 <ds:datastoreItem xmlns:ds="http://schemas.openxmlformats.org/officeDocument/2006/customXml" ds:itemID="{27FA6915-D8CD-41C3-AF64-CBB02067772B}">
   <ds:schemaRefs>
     <ds:schemaRef ds:uri="http://schemas.microsoft.com/sharepoint/v3/contenttype/forms"/>
@@ -14509,7 +14102,7 @@
 </ds:datastoreItem>
 </file>
 
-<file path=customXml/itemProps3.xml><?xml version="1.0" encoding="utf-8"?>
+<file path=customXml/itemProps2.xml><?xml version="1.0" encoding="utf-8"?>
 <ds:datastoreItem xmlns:ds="http://schemas.openxmlformats.org/officeDocument/2006/customXml" ds:itemID="{554360C2-2863-4ADF-ACD7-47FEBEE37F83}">
   <ds:schemaRefs>
     <ds:schemaRef ds:uri="http://schemas.microsoft.com/office/2006/metadata/contentType"/>
@@ -14523,4 +14116,19 @@
     <ds:schemaRef ds:uri="http://schemas.microsoft.com/office/infopath/2007/PartnerControls"/>
   </ds:schemaRefs>
 </ds:datastoreItem>
+</file>
+
+<file path=customXml/itemProps3.xml><?xml version="1.0" encoding="utf-8"?>
+<ds:datastoreItem xmlns:ds="http://schemas.openxmlformats.org/officeDocument/2006/customXml" ds:itemID="{EF15BCB2-E926-4FE6-8A3D-B25070C09F42}">
+  <ds:schemaRefs>
+    <ds:schemaRef ds:uri="http://purl.org/dc/terms/"/>
+    <ds:schemaRef ds:uri="http://schemas.openxmlformats.org/package/2006/metadata/core-properties"/>
+    <ds:schemaRef ds:uri="http://schemas.microsoft.com/office/2006/documentManagement/types"/>
+    <ds:schemaRef ds:uri="http://purl.org/dc/elements/1.1/"/>
+    <ds:schemaRef ds:uri="http://schemas.microsoft.com/office/2006/metadata/properties"/>
+    <ds:schemaRef ds:uri="http://schemas.microsoft.com/office/infopath/2007/PartnerControls"/>
+    <ds:schemaRef ds:uri="http://www.w3.org/XML/1998/namespace"/>
+    <ds:schemaRef ds:uri="http://purl.org/dc/dcmitype/"/>
+  </ds:schemaRefs>
+</ds:datastoreItem>
 </file>
</xml_diff>